<commit_message>
Full VPC Topics added
Full VPC Topics added
</commit_message>
<xml_diff>
--- a/VPC.pptx
+++ b/VPC.pptx
@@ -11,8 +11,12 @@
     <p:sldId id="261" r:id="rId5"/>
     <p:sldId id="262" r:id="rId6"/>
     <p:sldId id="263" r:id="rId7"/>
-    <p:sldId id="257" r:id="rId8"/>
-    <p:sldId id="258" r:id="rId9"/>
+    <p:sldId id="264" r:id="rId8"/>
+    <p:sldId id="265" r:id="rId9"/>
+    <p:sldId id="267" r:id="rId10"/>
+    <p:sldId id="266" r:id="rId11"/>
+    <p:sldId id="257" r:id="rId12"/>
+    <p:sldId id="258" r:id="rId13"/>
   </p:sldIdLst>
   <p:sldSz cx="12192000" cy="6858000"/>
   <p:notesSz cx="6858000" cy="9144000"/>
@@ -111,6 +115,11 @@
       </a:defRPr>
     </a:lvl9pPr>
   </p:defaultTextStyle>
+  <p:extLst>
+    <p:ext uri="{EFAFB233-063F-42B5-8137-9DF3F51BA10A}">
+      <p15:sldGuideLst xmlns:p15="http://schemas.microsoft.com/office/powerpoint/2012/main"/>
+    </p:ext>
+  </p:extLst>
 </p:presentation>
 </file>
 
@@ -263,7 +272,7 @@
           <a:p>
             <a:fld id="{51B9F265-BD10-F842-9F31-8105B9951F92}" type="datetimeFigureOut">
               <a:rPr lang="en-US" smtClean="0"/>
-              <a:t>3/3/22</a:t>
+              <a:t>3/6/22</a:t>
             </a:fld>
             <a:endParaRPr lang="en-US"/>
           </a:p>
@@ -463,7 +472,7 @@
           <a:p>
             <a:fld id="{51B9F265-BD10-F842-9F31-8105B9951F92}" type="datetimeFigureOut">
               <a:rPr lang="en-US" smtClean="0"/>
-              <a:t>3/3/22</a:t>
+              <a:t>3/6/22</a:t>
             </a:fld>
             <a:endParaRPr lang="en-US"/>
           </a:p>
@@ -673,7 +682,7 @@
           <a:p>
             <a:fld id="{51B9F265-BD10-F842-9F31-8105B9951F92}" type="datetimeFigureOut">
               <a:rPr lang="en-US" smtClean="0"/>
-              <a:t>3/3/22</a:t>
+              <a:t>3/6/22</a:t>
             </a:fld>
             <a:endParaRPr lang="en-US"/>
           </a:p>
@@ -873,7 +882,7 @@
           <a:p>
             <a:fld id="{51B9F265-BD10-F842-9F31-8105B9951F92}" type="datetimeFigureOut">
               <a:rPr lang="en-US" smtClean="0"/>
-              <a:t>3/3/22</a:t>
+              <a:t>3/6/22</a:t>
             </a:fld>
             <a:endParaRPr lang="en-US"/>
           </a:p>
@@ -1149,7 +1158,7 @@
           <a:p>
             <a:fld id="{51B9F265-BD10-F842-9F31-8105B9951F92}" type="datetimeFigureOut">
               <a:rPr lang="en-US" smtClean="0"/>
-              <a:t>3/3/22</a:t>
+              <a:t>3/6/22</a:t>
             </a:fld>
             <a:endParaRPr lang="en-US"/>
           </a:p>
@@ -1417,7 +1426,7 @@
           <a:p>
             <a:fld id="{51B9F265-BD10-F842-9F31-8105B9951F92}" type="datetimeFigureOut">
               <a:rPr lang="en-US" smtClean="0"/>
-              <a:t>3/3/22</a:t>
+              <a:t>3/6/22</a:t>
             </a:fld>
             <a:endParaRPr lang="en-US"/>
           </a:p>
@@ -1832,7 +1841,7 @@
           <a:p>
             <a:fld id="{51B9F265-BD10-F842-9F31-8105B9951F92}" type="datetimeFigureOut">
               <a:rPr lang="en-US" smtClean="0"/>
-              <a:t>3/3/22</a:t>
+              <a:t>3/6/22</a:t>
             </a:fld>
             <a:endParaRPr lang="en-US"/>
           </a:p>
@@ -1974,7 +1983,7 @@
           <a:p>
             <a:fld id="{51B9F265-BD10-F842-9F31-8105B9951F92}" type="datetimeFigureOut">
               <a:rPr lang="en-US" smtClean="0"/>
-              <a:t>3/3/22</a:t>
+              <a:t>3/6/22</a:t>
             </a:fld>
             <a:endParaRPr lang="en-US"/>
           </a:p>
@@ -2087,7 +2096,7 @@
           <a:p>
             <a:fld id="{51B9F265-BD10-F842-9F31-8105B9951F92}" type="datetimeFigureOut">
               <a:rPr lang="en-US" smtClean="0"/>
-              <a:t>3/3/22</a:t>
+              <a:t>3/6/22</a:t>
             </a:fld>
             <a:endParaRPr lang="en-US"/>
           </a:p>
@@ -2400,7 +2409,7 @@
           <a:p>
             <a:fld id="{51B9F265-BD10-F842-9F31-8105B9951F92}" type="datetimeFigureOut">
               <a:rPr lang="en-US" smtClean="0"/>
-              <a:t>3/3/22</a:t>
+              <a:t>3/6/22</a:t>
             </a:fld>
             <a:endParaRPr lang="en-US"/>
           </a:p>
@@ -2689,7 +2698,7 @@
           <a:p>
             <a:fld id="{51B9F265-BD10-F842-9F31-8105B9951F92}" type="datetimeFigureOut">
               <a:rPr lang="en-US" smtClean="0"/>
-              <a:t>3/3/22</a:t>
+              <a:t>3/6/22</a:t>
             </a:fld>
             <a:endParaRPr lang="en-US"/>
           </a:p>
@@ -2932,7 +2941,7 @@
           <a:p>
             <a:fld id="{51B9F265-BD10-F842-9F31-8105B9951F92}" type="datetimeFigureOut">
               <a:rPr lang="en-US" smtClean="0"/>
-              <a:t>3/3/22</a:t>
+              <a:t>3/6/22</a:t>
             </a:fld>
             <a:endParaRPr lang="en-US"/>
           </a:p>
@@ -3519,6 +3528,2084 @@
 </p:sld>
 </file>
 
+<file path=ppt/slides/slide10.xml><?xml version="1.0" encoding="utf-8"?>
+<p:sld xmlns:a="http://schemas.openxmlformats.org/drawingml/2006/main" xmlns:r="http://schemas.openxmlformats.org/officeDocument/2006/relationships" xmlns:p="http://schemas.openxmlformats.org/presentationml/2006/main">
+  <p:cSld>
+    <p:spTree>
+      <p:nvGrpSpPr>
+        <p:cNvPr id="1" name=""/>
+        <p:cNvGrpSpPr/>
+        <p:nvPr/>
+      </p:nvGrpSpPr>
+      <p:grpSpPr>
+        <a:xfrm>
+          <a:off x="0" y="0"/>
+          <a:ext cx="0" cy="0"/>
+          <a:chOff x="0" y="0"/>
+          <a:chExt cx="0" cy="0"/>
+        </a:xfrm>
+      </p:grpSpPr>
+      <p:sp>
+        <p:nvSpPr>
+          <p:cNvPr id="4" name="Rectangle 3">
+            <a:extLst>
+              <a:ext uri="{FF2B5EF4-FFF2-40B4-BE49-F238E27FC236}">
+                <a16:creationId xmlns:a16="http://schemas.microsoft.com/office/drawing/2014/main" id="{2123E19E-5090-B74B-907E-94BACEDF57F4}"/>
+              </a:ext>
+            </a:extLst>
+          </p:cNvPr>
+          <p:cNvSpPr/>
+          <p:nvPr/>
+        </p:nvSpPr>
+        <p:spPr>
+          <a:xfrm>
+            <a:off x="622169" y="1028343"/>
+            <a:ext cx="10077254" cy="4278094"/>
+          </a:xfrm>
+          <a:prstGeom prst="rect">
+            <a:avLst/>
+          </a:prstGeom>
+        </p:spPr>
+        <p:txBody>
+          <a:bodyPr wrap="square">
+            <a:spAutoFit/>
+          </a:bodyPr>
+          <a:lstStyle/>
+          <a:p>
+            <a:r>
+              <a:rPr lang="en-IN" b="1" dirty="0">
+                <a:solidFill>
+                  <a:srgbClr val="254869"/>
+                </a:solidFill>
+                <a:latin typeface="Montserrat" panose="020F0502020204030204" pitchFamily="34" charset="0"/>
+              </a:rPr>
+              <a:t>Putting it together</a:t>
+            </a:r>
+          </a:p>
+          <a:p>
+            <a:endParaRPr lang="en-IN" dirty="0">
+              <a:solidFill>
+                <a:srgbClr val="2C3346"/>
+              </a:solidFill>
+              <a:latin typeface="Open Sans" panose="020B0606030504020204" pitchFamily="34" charset="0"/>
+            </a:endParaRPr>
+          </a:p>
+          <a:p>
+            <a:r>
+              <a:rPr lang="en-IN" b="1" dirty="0">
+                <a:solidFill>
+                  <a:srgbClr val="2C3346"/>
+                </a:solidFill>
+                <a:latin typeface="Open Sans" panose="020B0606030504020204" pitchFamily="34" charset="0"/>
+              </a:rPr>
+              <a:t>For a public subnet to have Internet access, inbound and outbound, an account needs:</a:t>
+            </a:r>
+          </a:p>
+          <a:p>
+            <a:pPr lvl="1">
+              <a:buFont typeface="Arial" panose="020B0604020202020204" pitchFamily="34" charset="0"/>
+              <a:buChar char="•"/>
+            </a:pPr>
+            <a:r>
+              <a:rPr lang="en-IN" sz="1600" dirty="0">
+                <a:solidFill>
+                  <a:srgbClr val="2C3346"/>
+                </a:solidFill>
+                <a:latin typeface="Open Sans" panose="020B0606030504020204" pitchFamily="34" charset="0"/>
+              </a:rPr>
+              <a:t>Internet Gateway attached to a VPC</a:t>
+            </a:r>
+          </a:p>
+          <a:p>
+            <a:pPr lvl="1">
+              <a:buFont typeface="Arial" panose="020B0604020202020204" pitchFamily="34" charset="0"/>
+              <a:buChar char="•"/>
+            </a:pPr>
+            <a:r>
+              <a:rPr lang="en-IN" sz="1600" dirty="0">
+                <a:solidFill>
+                  <a:srgbClr val="2C3346"/>
+                </a:solidFill>
+                <a:latin typeface="Open Sans" panose="020B0606030504020204" pitchFamily="34" charset="0"/>
+              </a:rPr>
+              <a:t>Route to the Internet Gateway in the attached route table</a:t>
+            </a:r>
+          </a:p>
+          <a:p>
+            <a:pPr lvl="1">
+              <a:buFont typeface="Arial" panose="020B0604020202020204" pitchFamily="34" charset="0"/>
+              <a:buChar char="•"/>
+            </a:pPr>
+            <a:r>
+              <a:rPr lang="en-IN" sz="1600" dirty="0">
+                <a:solidFill>
+                  <a:srgbClr val="2C3346"/>
+                </a:solidFill>
+                <a:latin typeface="Open Sans" panose="020B0606030504020204" pitchFamily="34" charset="0"/>
+              </a:rPr>
+              <a:t>Instances have public IP addresses (auto-assigned or attached Elastic IP address)</a:t>
+            </a:r>
+          </a:p>
+          <a:p>
+            <a:pPr lvl="1">
+              <a:buFont typeface="Arial" panose="020B0604020202020204" pitchFamily="34" charset="0"/>
+              <a:buChar char="•"/>
+            </a:pPr>
+            <a:r>
+              <a:rPr lang="en-IN" sz="1600" dirty="0">
+                <a:solidFill>
+                  <a:srgbClr val="2C3346"/>
+                </a:solidFill>
+                <a:latin typeface="Open Sans" panose="020B0606030504020204" pitchFamily="34" charset="0"/>
+              </a:rPr>
+              <a:t>Appropriate security group and NACL allowances</a:t>
+            </a:r>
+          </a:p>
+          <a:p>
+            <a:pPr lvl="1"/>
+            <a:endParaRPr lang="en-IN" dirty="0">
+              <a:solidFill>
+                <a:srgbClr val="2C3346"/>
+              </a:solidFill>
+              <a:latin typeface="Open Sans" panose="020B0606030504020204" pitchFamily="34" charset="0"/>
+            </a:endParaRPr>
+          </a:p>
+          <a:p>
+            <a:r>
+              <a:rPr lang="en-IN" b="1" dirty="0">
+                <a:solidFill>
+                  <a:srgbClr val="2C3346"/>
+                </a:solidFill>
+                <a:latin typeface="Open Sans" panose="020B0606030504020204" pitchFamily="34" charset="0"/>
+              </a:rPr>
+              <a:t>For a private subnet to have Internet access, the following will provide outbound Internet access but not inbound:</a:t>
+            </a:r>
+          </a:p>
+          <a:p>
+            <a:pPr lvl="1">
+              <a:buFont typeface="Arial" panose="020B0604020202020204" pitchFamily="34" charset="0"/>
+              <a:buChar char="•"/>
+            </a:pPr>
+            <a:r>
+              <a:rPr lang="en-IN" sz="1600" dirty="0">
+                <a:solidFill>
+                  <a:srgbClr val="2C3346"/>
+                </a:solidFill>
+                <a:latin typeface="Open Sans" panose="020B0606030504020204" pitchFamily="34" charset="0"/>
+              </a:rPr>
+              <a:t>Internet Gateway attached to a VPC</a:t>
+            </a:r>
+          </a:p>
+          <a:p>
+            <a:pPr lvl="1">
+              <a:buFont typeface="Arial" panose="020B0604020202020204" pitchFamily="34" charset="0"/>
+              <a:buChar char="•"/>
+            </a:pPr>
+            <a:r>
+              <a:rPr lang="en-IN" sz="1600" dirty="0">
+                <a:solidFill>
+                  <a:srgbClr val="2C3346"/>
+                </a:solidFill>
+                <a:latin typeface="Open Sans" panose="020B0606030504020204" pitchFamily="34" charset="0"/>
+              </a:rPr>
+              <a:t>NAT Gateway or Instance in a public subnet in the same VPC</a:t>
+            </a:r>
+          </a:p>
+          <a:p>
+            <a:pPr lvl="1">
+              <a:buFont typeface="Arial" panose="020B0604020202020204" pitchFamily="34" charset="0"/>
+              <a:buChar char="•"/>
+            </a:pPr>
+            <a:r>
+              <a:rPr lang="en-IN" sz="1600" dirty="0"/>
+              <a:t>Route to the NAT Gateway or Instance in the private subnet’s attached route table</a:t>
+            </a:r>
+          </a:p>
+          <a:p>
+            <a:pPr lvl="1">
+              <a:buFont typeface="Arial" panose="020B0604020202020204" pitchFamily="34" charset="0"/>
+              <a:buChar char="•"/>
+            </a:pPr>
+            <a:r>
+              <a:rPr lang="en-IN" sz="1600" dirty="0"/>
+              <a:t>Appropriate security group and NACL allowances</a:t>
+            </a:r>
+          </a:p>
+          <a:p>
+            <a:br>
+              <a:rPr lang="en-IN" dirty="0"/>
+            </a:br>
+            <a:endParaRPr lang="en-IN" b="0" i="0" dirty="0">
+              <a:solidFill>
+                <a:srgbClr val="2C3346"/>
+              </a:solidFill>
+              <a:effectLst/>
+              <a:latin typeface="Open Sans" panose="020B0606030504020204" pitchFamily="34" charset="0"/>
+            </a:endParaRPr>
+          </a:p>
+        </p:txBody>
+      </p:sp>
+    </p:spTree>
+    <p:extLst>
+      <p:ext uri="{BB962C8B-B14F-4D97-AF65-F5344CB8AC3E}">
+        <p14:creationId xmlns:p14="http://schemas.microsoft.com/office/powerpoint/2010/main" val="2894000370"/>
+      </p:ext>
+    </p:extLst>
+  </p:cSld>
+  <p:clrMapOvr>
+    <a:masterClrMapping/>
+  </p:clrMapOvr>
+</p:sld>
+</file>
+
+<file path=ppt/slides/slide11.xml><?xml version="1.0" encoding="utf-8"?>
+<p:sld xmlns:a="http://schemas.openxmlformats.org/drawingml/2006/main" xmlns:r="http://schemas.openxmlformats.org/officeDocument/2006/relationships" xmlns:p="http://schemas.openxmlformats.org/presentationml/2006/main">
+  <p:cSld>
+    <p:spTree>
+      <p:nvGrpSpPr>
+        <p:cNvPr id="1" name=""/>
+        <p:cNvGrpSpPr/>
+        <p:nvPr/>
+      </p:nvGrpSpPr>
+      <p:grpSpPr>
+        <a:xfrm>
+          <a:off x="0" y="0"/>
+          <a:ext cx="0" cy="0"/>
+          <a:chOff x="0" y="0"/>
+          <a:chExt cx="0" cy="0"/>
+        </a:xfrm>
+      </p:grpSpPr>
+      <p:sp>
+        <p:nvSpPr>
+          <p:cNvPr id="5" name="Frame 4">
+            <a:extLst>
+              <a:ext uri="{FF2B5EF4-FFF2-40B4-BE49-F238E27FC236}">
+                <a16:creationId xmlns:a16="http://schemas.microsoft.com/office/drawing/2014/main" id="{E873FC54-21EC-424B-81C7-45E24006E66E}"/>
+              </a:ext>
+            </a:extLst>
+          </p:cNvPr>
+          <p:cNvSpPr/>
+          <p:nvPr/>
+        </p:nvSpPr>
+        <p:spPr>
+          <a:xfrm>
+            <a:off x="1518082" y="1180730"/>
+            <a:ext cx="4216893" cy="4119239"/>
+          </a:xfrm>
+          <a:prstGeom prst="frame">
+            <a:avLst/>
+          </a:prstGeom>
+        </p:spPr>
+        <p:style>
+          <a:lnRef idx="2">
+            <a:schemeClr val="accent1">
+              <a:shade val="50000"/>
+            </a:schemeClr>
+          </a:lnRef>
+          <a:fillRef idx="1">
+            <a:schemeClr val="accent1"/>
+          </a:fillRef>
+          <a:effectRef idx="0">
+            <a:schemeClr val="accent1"/>
+          </a:effectRef>
+          <a:fontRef idx="minor">
+            <a:schemeClr val="lt1"/>
+          </a:fontRef>
+        </p:style>
+        <p:txBody>
+          <a:bodyPr rtlCol="0" anchor="ctr"/>
+          <a:lstStyle/>
+          <a:p>
+            <a:pPr algn="ctr"/>
+            <a:endParaRPr lang="en-US">
+              <a:solidFill>
+                <a:schemeClr val="tx1"/>
+              </a:solidFill>
+            </a:endParaRPr>
+          </a:p>
+        </p:txBody>
+      </p:sp>
+      <p:sp>
+        <p:nvSpPr>
+          <p:cNvPr id="6" name="Frame 5">
+            <a:extLst>
+              <a:ext uri="{FF2B5EF4-FFF2-40B4-BE49-F238E27FC236}">
+                <a16:creationId xmlns:a16="http://schemas.microsoft.com/office/drawing/2014/main" id="{0BB8B278-637C-E841-BC72-72BB64C3FE2B}"/>
+              </a:ext>
+            </a:extLst>
+          </p:cNvPr>
+          <p:cNvSpPr/>
+          <p:nvPr/>
+        </p:nvSpPr>
+        <p:spPr>
+          <a:xfrm>
+            <a:off x="6968971" y="1331650"/>
+            <a:ext cx="4305670" cy="3968319"/>
+          </a:xfrm>
+          <a:prstGeom prst="frame">
+            <a:avLst/>
+          </a:prstGeom>
+        </p:spPr>
+        <p:style>
+          <a:lnRef idx="2">
+            <a:schemeClr val="accent1">
+              <a:shade val="50000"/>
+            </a:schemeClr>
+          </a:lnRef>
+          <a:fillRef idx="1">
+            <a:schemeClr val="accent1"/>
+          </a:fillRef>
+          <a:effectRef idx="0">
+            <a:schemeClr val="accent1"/>
+          </a:effectRef>
+          <a:fontRef idx="minor">
+            <a:schemeClr val="lt1"/>
+          </a:fontRef>
+        </p:style>
+        <p:txBody>
+          <a:bodyPr rtlCol="0" anchor="ctr"/>
+          <a:lstStyle/>
+          <a:p>
+            <a:pPr algn="ctr"/>
+            <a:endParaRPr lang="en-US">
+              <a:solidFill>
+                <a:schemeClr val="tx1"/>
+              </a:solidFill>
+            </a:endParaRPr>
+          </a:p>
+        </p:txBody>
+      </p:sp>
+      <p:sp>
+        <p:nvSpPr>
+          <p:cNvPr id="7" name="Frame 6">
+            <a:extLst>
+              <a:ext uri="{FF2B5EF4-FFF2-40B4-BE49-F238E27FC236}">
+                <a16:creationId xmlns:a16="http://schemas.microsoft.com/office/drawing/2014/main" id="{1053D7AE-A7D7-5E46-8271-C90993313888}"/>
+              </a:ext>
+            </a:extLst>
+          </p:cNvPr>
+          <p:cNvSpPr/>
+          <p:nvPr/>
+        </p:nvSpPr>
+        <p:spPr>
+          <a:xfrm>
+            <a:off x="529701" y="239696"/>
+            <a:ext cx="11662299" cy="6001305"/>
+          </a:xfrm>
+          <a:prstGeom prst="frame">
+            <a:avLst/>
+          </a:prstGeom>
+        </p:spPr>
+        <p:style>
+          <a:lnRef idx="2">
+            <a:schemeClr val="accent1">
+              <a:shade val="50000"/>
+            </a:schemeClr>
+          </a:lnRef>
+          <a:fillRef idx="1">
+            <a:schemeClr val="accent1"/>
+          </a:fillRef>
+          <a:effectRef idx="0">
+            <a:schemeClr val="accent1"/>
+          </a:effectRef>
+          <a:fontRef idx="minor">
+            <a:schemeClr val="lt1"/>
+          </a:fontRef>
+        </p:style>
+        <p:txBody>
+          <a:bodyPr rtlCol="0" anchor="ctr"/>
+          <a:lstStyle/>
+          <a:p>
+            <a:pPr algn="ctr"/>
+            <a:endParaRPr lang="en-US" dirty="0">
+              <a:solidFill>
+                <a:schemeClr val="tx1"/>
+              </a:solidFill>
+            </a:endParaRPr>
+          </a:p>
+        </p:txBody>
+      </p:sp>
+      <p:sp>
+        <p:nvSpPr>
+          <p:cNvPr id="8" name="TextBox 7">
+            <a:extLst>
+              <a:ext uri="{FF2B5EF4-FFF2-40B4-BE49-F238E27FC236}">
+                <a16:creationId xmlns:a16="http://schemas.microsoft.com/office/drawing/2014/main" id="{CD7AFC8A-D092-4B48-9D2F-0D682342C93D}"/>
+              </a:ext>
+            </a:extLst>
+          </p:cNvPr>
+          <p:cNvSpPr txBox="1"/>
+          <p:nvPr/>
+        </p:nvSpPr>
+        <p:spPr>
+          <a:xfrm>
+            <a:off x="3018408" y="2743200"/>
+            <a:ext cx="1791644" cy="369332"/>
+          </a:xfrm>
+          <a:prstGeom prst="rect">
+            <a:avLst/>
+          </a:prstGeom>
+          <a:noFill/>
+        </p:spPr>
+        <p:txBody>
+          <a:bodyPr wrap="none" rtlCol="0">
+            <a:spAutoFit/>
+          </a:bodyPr>
+          <a:lstStyle/>
+          <a:p>
+            <a:r>
+              <a:rPr lang="en-US" dirty="0"/>
+              <a:t>Mumbai - Region</a:t>
+            </a:r>
+          </a:p>
+        </p:txBody>
+      </p:sp>
+      <p:sp>
+        <p:nvSpPr>
+          <p:cNvPr id="9" name="TextBox 8">
+            <a:extLst>
+              <a:ext uri="{FF2B5EF4-FFF2-40B4-BE49-F238E27FC236}">
+                <a16:creationId xmlns:a16="http://schemas.microsoft.com/office/drawing/2014/main" id="{1D4B2041-2422-F740-9FB9-E55E196ED95D}"/>
+              </a:ext>
+            </a:extLst>
+          </p:cNvPr>
+          <p:cNvSpPr txBox="1"/>
+          <p:nvPr/>
+        </p:nvSpPr>
+        <p:spPr>
+          <a:xfrm>
+            <a:off x="8351591" y="2195659"/>
+            <a:ext cx="1207959" cy="369332"/>
+          </a:xfrm>
+          <a:prstGeom prst="rect">
+            <a:avLst/>
+          </a:prstGeom>
+          <a:noFill/>
+        </p:spPr>
+        <p:txBody>
+          <a:bodyPr wrap="none" rtlCol="0">
+            <a:spAutoFit/>
+          </a:bodyPr>
+          <a:lstStyle/>
+          <a:p>
+            <a:r>
+              <a:rPr lang="en-US" dirty="0"/>
+              <a:t>Hyderabad</a:t>
+            </a:r>
+          </a:p>
+        </p:txBody>
+      </p:sp>
+      <p:sp>
+        <p:nvSpPr>
+          <p:cNvPr id="10" name="TextBox 9">
+            <a:extLst>
+              <a:ext uri="{FF2B5EF4-FFF2-40B4-BE49-F238E27FC236}">
+                <a16:creationId xmlns:a16="http://schemas.microsoft.com/office/drawing/2014/main" id="{51E02B9A-6A8C-BD43-B9A7-4BD5D08EB1B2}"/>
+              </a:ext>
+            </a:extLst>
+          </p:cNvPr>
+          <p:cNvSpPr txBox="1"/>
+          <p:nvPr/>
+        </p:nvSpPr>
+        <p:spPr>
+          <a:xfrm>
+            <a:off x="2299318" y="3315809"/>
+            <a:ext cx="2760954" cy="1200329"/>
+          </a:xfrm>
+          <a:prstGeom prst="rect">
+            <a:avLst/>
+          </a:prstGeom>
+          <a:noFill/>
+        </p:spPr>
+        <p:txBody>
+          <a:bodyPr wrap="square" rtlCol="0">
+            <a:spAutoFit/>
+          </a:bodyPr>
+          <a:lstStyle/>
+          <a:p>
+            <a:r>
+              <a:rPr lang="en-US" dirty="0"/>
+              <a:t>Andheri AZ-1</a:t>
+            </a:r>
+          </a:p>
+          <a:p>
+            <a:endParaRPr lang="en-US" dirty="0"/>
+          </a:p>
+          <a:p>
+            <a:endParaRPr lang="en-US" dirty="0"/>
+          </a:p>
+          <a:p>
+            <a:r>
+              <a:rPr lang="en-US" dirty="0" err="1"/>
+              <a:t>Malad</a:t>
+            </a:r>
+            <a:r>
+              <a:rPr lang="en-US" dirty="0"/>
+              <a:t> AZ-2</a:t>
+            </a:r>
+          </a:p>
+        </p:txBody>
+      </p:sp>
+      <p:sp>
+        <p:nvSpPr>
+          <p:cNvPr id="11" name="TextBox 10">
+            <a:extLst>
+              <a:ext uri="{FF2B5EF4-FFF2-40B4-BE49-F238E27FC236}">
+                <a16:creationId xmlns:a16="http://schemas.microsoft.com/office/drawing/2014/main" id="{E74F692B-FAE2-1044-8583-B2FBB2A68010}"/>
+              </a:ext>
+            </a:extLst>
+          </p:cNvPr>
+          <p:cNvSpPr txBox="1"/>
+          <p:nvPr/>
+        </p:nvSpPr>
+        <p:spPr>
+          <a:xfrm>
+            <a:off x="7836823" y="2909402"/>
+            <a:ext cx="2636135" cy="1477328"/>
+          </a:xfrm>
+          <a:prstGeom prst="rect">
+            <a:avLst/>
+          </a:prstGeom>
+          <a:noFill/>
+        </p:spPr>
+        <p:txBody>
+          <a:bodyPr wrap="square" rtlCol="0">
+            <a:spAutoFit/>
+          </a:bodyPr>
+          <a:lstStyle/>
+          <a:p>
+            <a:r>
+              <a:rPr lang="en-US" dirty="0" err="1"/>
+              <a:t>MerkhanPet</a:t>
+            </a:r>
+            <a:r>
+              <a:rPr lang="en-US" dirty="0"/>
+              <a:t> – Flipkart</a:t>
+            </a:r>
+          </a:p>
+          <a:p>
+            <a:r>
+              <a:rPr lang="en-US" dirty="0"/>
+              <a:t>AZ-1</a:t>
+            </a:r>
+          </a:p>
+          <a:p>
+            <a:endParaRPr lang="en-US" dirty="0"/>
+          </a:p>
+          <a:p>
+            <a:r>
+              <a:rPr lang="en-US" dirty="0" err="1"/>
+              <a:t>Chandravelli</a:t>
+            </a:r>
+            <a:r>
+              <a:rPr lang="en-US" dirty="0"/>
+              <a:t> – Flipkart</a:t>
+            </a:r>
+          </a:p>
+          <a:p>
+            <a:r>
+              <a:rPr lang="en-US" dirty="0"/>
+              <a:t>AZ-2</a:t>
+            </a:r>
+          </a:p>
+        </p:txBody>
+      </p:sp>
+      <p:sp>
+        <p:nvSpPr>
+          <p:cNvPr id="13" name="TextBox 12">
+            <a:extLst>
+              <a:ext uri="{FF2B5EF4-FFF2-40B4-BE49-F238E27FC236}">
+                <a16:creationId xmlns:a16="http://schemas.microsoft.com/office/drawing/2014/main" id="{BC232BF2-5980-FD4E-BA94-FF1E997898EB}"/>
+              </a:ext>
+            </a:extLst>
+          </p:cNvPr>
+          <p:cNvSpPr txBox="1"/>
+          <p:nvPr/>
+        </p:nvSpPr>
+        <p:spPr>
+          <a:xfrm>
+            <a:off x="9559550" y="2183199"/>
+            <a:ext cx="826637" cy="369332"/>
+          </a:xfrm>
+          <a:prstGeom prst="rect">
+            <a:avLst/>
+          </a:prstGeom>
+          <a:noFill/>
+        </p:spPr>
+        <p:txBody>
+          <a:bodyPr wrap="none" rtlCol="0">
+            <a:spAutoFit/>
+          </a:bodyPr>
+          <a:lstStyle/>
+          <a:p>
+            <a:r>
+              <a:rPr lang="en-US" dirty="0"/>
+              <a:t>Region</a:t>
+            </a:r>
+          </a:p>
+        </p:txBody>
+      </p:sp>
+      <p:cxnSp>
+        <p:nvCxnSpPr>
+          <p:cNvPr id="15" name="Straight Arrow Connector 14">
+            <a:extLst>
+              <a:ext uri="{FF2B5EF4-FFF2-40B4-BE49-F238E27FC236}">
+                <a16:creationId xmlns:a16="http://schemas.microsoft.com/office/drawing/2014/main" id="{D7C6E5B1-C85D-0A4C-8339-46C35EAAB9C0}"/>
+              </a:ext>
+            </a:extLst>
+          </p:cNvPr>
+          <p:cNvCxnSpPr>
+            <a:stCxn id="6" idx="1"/>
+          </p:cNvCxnSpPr>
+          <p:nvPr/>
+        </p:nvCxnSpPr>
+        <p:spPr>
+          <a:xfrm flipH="1">
+            <a:off x="5734975" y="3315810"/>
+            <a:ext cx="1233996" cy="113190"/>
+          </a:xfrm>
+          <a:prstGeom prst="straightConnector1">
+            <a:avLst/>
+          </a:prstGeom>
+          <a:ln>
+            <a:tailEnd type="triangle"/>
+          </a:ln>
+        </p:spPr>
+        <p:style>
+          <a:lnRef idx="1">
+            <a:schemeClr val="accent1"/>
+          </a:lnRef>
+          <a:fillRef idx="0">
+            <a:schemeClr val="accent1"/>
+          </a:fillRef>
+          <a:effectRef idx="0">
+            <a:schemeClr val="accent1"/>
+          </a:effectRef>
+          <a:fontRef idx="minor">
+            <a:schemeClr val="tx1"/>
+          </a:fontRef>
+        </p:style>
+      </p:cxnSp>
+      <p:cxnSp>
+        <p:nvCxnSpPr>
+          <p:cNvPr id="17" name="Straight Arrow Connector 16">
+            <a:extLst>
+              <a:ext uri="{FF2B5EF4-FFF2-40B4-BE49-F238E27FC236}">
+                <a16:creationId xmlns:a16="http://schemas.microsoft.com/office/drawing/2014/main" id="{2966B6E8-FA45-E946-A272-1E6B5C4EECAF}"/>
+              </a:ext>
+            </a:extLst>
+          </p:cNvPr>
+          <p:cNvCxnSpPr/>
+          <p:nvPr/>
+        </p:nvCxnSpPr>
+        <p:spPr>
+          <a:xfrm flipV="1">
+            <a:off x="5734975" y="2743200"/>
+            <a:ext cx="1233996" cy="166202"/>
+          </a:xfrm>
+          <a:prstGeom prst="straightConnector1">
+            <a:avLst/>
+          </a:prstGeom>
+          <a:ln>
+            <a:tailEnd type="triangle"/>
+          </a:ln>
+        </p:spPr>
+        <p:style>
+          <a:lnRef idx="1">
+            <a:schemeClr val="accent1"/>
+          </a:lnRef>
+          <a:fillRef idx="0">
+            <a:schemeClr val="accent1"/>
+          </a:fillRef>
+          <a:effectRef idx="0">
+            <a:schemeClr val="accent1"/>
+          </a:effectRef>
+          <a:fontRef idx="minor">
+            <a:schemeClr val="tx1"/>
+          </a:fontRef>
+        </p:style>
+      </p:cxnSp>
+      <p:sp>
+        <p:nvSpPr>
+          <p:cNvPr id="18" name="TextBox 17">
+            <a:extLst>
+              <a:ext uri="{FF2B5EF4-FFF2-40B4-BE49-F238E27FC236}">
+                <a16:creationId xmlns:a16="http://schemas.microsoft.com/office/drawing/2014/main" id="{04B79F4F-05BA-6543-9D1D-A33312659978}"/>
+              </a:ext>
+            </a:extLst>
+          </p:cNvPr>
+          <p:cNvSpPr txBox="1"/>
+          <p:nvPr/>
+        </p:nvSpPr>
+        <p:spPr>
+          <a:xfrm>
+            <a:off x="5779552" y="1918660"/>
+            <a:ext cx="1040606" cy="646331"/>
+          </a:xfrm>
+          <a:prstGeom prst="rect">
+            <a:avLst/>
+          </a:prstGeom>
+          <a:noFill/>
+        </p:spPr>
+        <p:txBody>
+          <a:bodyPr wrap="none" rtlCol="0">
+            <a:spAutoFit/>
+          </a:bodyPr>
+          <a:lstStyle/>
+          <a:p>
+            <a:r>
+              <a:rPr lang="en-US" dirty="0"/>
+              <a:t>Disaster</a:t>
+            </a:r>
+          </a:p>
+          <a:p>
+            <a:r>
+              <a:rPr lang="en-US" dirty="0"/>
+              <a:t>Recovery</a:t>
+            </a:r>
+          </a:p>
+        </p:txBody>
+      </p:sp>
+      <p:sp>
+        <p:nvSpPr>
+          <p:cNvPr id="19" name="Rectangle 18">
+            <a:extLst>
+              <a:ext uri="{FF2B5EF4-FFF2-40B4-BE49-F238E27FC236}">
+                <a16:creationId xmlns:a16="http://schemas.microsoft.com/office/drawing/2014/main" id="{9B87830E-303D-9048-B1FA-BA53E82705C3}"/>
+              </a:ext>
+            </a:extLst>
+          </p:cNvPr>
+          <p:cNvSpPr/>
+          <p:nvPr/>
+        </p:nvSpPr>
+        <p:spPr>
+          <a:xfrm>
+            <a:off x="4685269" y="6526853"/>
+            <a:ext cx="1851212" cy="307777"/>
+          </a:xfrm>
+          <a:prstGeom prst="rect">
+            <a:avLst/>
+          </a:prstGeom>
+        </p:spPr>
+        <p:txBody>
+          <a:bodyPr wrap="none">
+            <a:spAutoFit/>
+          </a:bodyPr>
+          <a:lstStyle/>
+          <a:p>
+            <a:r>
+              <a:rPr lang="en-US" sz="1400" b="1" dirty="0"/>
+              <a:t>Running Notes in class</a:t>
+            </a:r>
+          </a:p>
+        </p:txBody>
+      </p:sp>
+    </p:spTree>
+    <p:extLst>
+      <p:ext uri="{BB962C8B-B14F-4D97-AF65-F5344CB8AC3E}">
+        <p14:creationId xmlns:p14="http://schemas.microsoft.com/office/powerpoint/2010/main" val="2210824700"/>
+      </p:ext>
+    </p:extLst>
+  </p:cSld>
+  <p:clrMapOvr>
+    <a:masterClrMapping/>
+  </p:clrMapOvr>
+</p:sld>
+</file>
+
+<file path=ppt/slides/slide12.xml><?xml version="1.0" encoding="utf-8"?>
+<p:sld xmlns:a="http://schemas.openxmlformats.org/drawingml/2006/main" xmlns:r="http://schemas.openxmlformats.org/officeDocument/2006/relationships" xmlns:p="http://schemas.openxmlformats.org/presentationml/2006/main">
+  <p:cSld>
+    <p:spTree>
+      <p:nvGrpSpPr>
+        <p:cNvPr id="1" name=""/>
+        <p:cNvGrpSpPr/>
+        <p:nvPr/>
+      </p:nvGrpSpPr>
+      <p:grpSpPr>
+        <a:xfrm>
+          <a:off x="0" y="0"/>
+          <a:ext cx="0" cy="0"/>
+          <a:chOff x="0" y="0"/>
+          <a:chExt cx="0" cy="0"/>
+        </a:xfrm>
+      </p:grpSpPr>
+      <p:sp>
+        <p:nvSpPr>
+          <p:cNvPr id="3" name="Content Placeholder 2">
+            <a:extLst>
+              <a:ext uri="{FF2B5EF4-FFF2-40B4-BE49-F238E27FC236}">
+                <a16:creationId xmlns:a16="http://schemas.microsoft.com/office/drawing/2014/main" id="{D33CC403-B472-D748-BFB5-F4C96696F3B2}"/>
+              </a:ext>
+            </a:extLst>
+          </p:cNvPr>
+          <p:cNvSpPr>
+            <a:spLocks noGrp="1"/>
+          </p:cNvSpPr>
+          <p:nvPr>
+            <p:ph idx="1"/>
+          </p:nvPr>
+        </p:nvSpPr>
+        <p:spPr>
+          <a:xfrm>
+            <a:off x="490555" y="325298"/>
+            <a:ext cx="10515600" cy="926452"/>
+          </a:xfrm>
+        </p:spPr>
+        <p:txBody>
+          <a:bodyPr>
+            <a:normAutofit/>
+          </a:bodyPr>
+          <a:lstStyle/>
+          <a:p>
+            <a:r>
+              <a:rPr lang="en-US" sz="1000" dirty="0"/>
+              <a:t> Region</a:t>
+            </a:r>
+          </a:p>
+          <a:p>
+            <a:pPr lvl="1"/>
+            <a:r>
+              <a:rPr lang="en-US" sz="1000" dirty="0"/>
+              <a:t>AZ  </a:t>
+            </a:r>
+          </a:p>
+          <a:p>
+            <a:pPr lvl="2"/>
+            <a:r>
+              <a:rPr lang="en-US" sz="1000" dirty="0"/>
+              <a:t>Subnet </a:t>
+            </a:r>
+          </a:p>
+        </p:txBody>
+      </p:sp>
+      <p:sp>
+        <p:nvSpPr>
+          <p:cNvPr id="4" name="Frame 3">
+            <a:extLst>
+              <a:ext uri="{FF2B5EF4-FFF2-40B4-BE49-F238E27FC236}">
+                <a16:creationId xmlns:a16="http://schemas.microsoft.com/office/drawing/2014/main" id="{76188D35-A1C4-0649-AA92-5FDBD67BD277}"/>
+              </a:ext>
+            </a:extLst>
+          </p:cNvPr>
+          <p:cNvSpPr/>
+          <p:nvPr/>
+        </p:nvSpPr>
+        <p:spPr>
+          <a:xfrm>
+            <a:off x="736846" y="2130641"/>
+            <a:ext cx="5122415" cy="3817398"/>
+          </a:xfrm>
+          <a:prstGeom prst="frame">
+            <a:avLst/>
+          </a:prstGeom>
+        </p:spPr>
+        <p:style>
+          <a:lnRef idx="2">
+            <a:schemeClr val="accent1">
+              <a:shade val="50000"/>
+            </a:schemeClr>
+          </a:lnRef>
+          <a:fillRef idx="1">
+            <a:schemeClr val="accent1"/>
+          </a:fillRef>
+          <a:effectRef idx="0">
+            <a:schemeClr val="accent1"/>
+          </a:effectRef>
+          <a:fontRef idx="minor">
+            <a:schemeClr val="lt1"/>
+          </a:fontRef>
+        </p:style>
+        <p:txBody>
+          <a:bodyPr rtlCol="0" anchor="ctr"/>
+          <a:lstStyle/>
+          <a:p>
+            <a:pPr algn="ctr"/>
+            <a:endParaRPr lang="en-US" dirty="0">
+              <a:solidFill>
+                <a:schemeClr val="tx1"/>
+              </a:solidFill>
+            </a:endParaRPr>
+          </a:p>
+        </p:txBody>
+      </p:sp>
+      <p:sp>
+        <p:nvSpPr>
+          <p:cNvPr id="9" name="TextBox 8">
+            <a:extLst>
+              <a:ext uri="{FF2B5EF4-FFF2-40B4-BE49-F238E27FC236}">
+                <a16:creationId xmlns:a16="http://schemas.microsoft.com/office/drawing/2014/main" id="{B763A9A5-2AF3-734B-AF1B-A1C52B781506}"/>
+              </a:ext>
+            </a:extLst>
+          </p:cNvPr>
+          <p:cNvSpPr txBox="1"/>
+          <p:nvPr/>
+        </p:nvSpPr>
+        <p:spPr>
+          <a:xfrm>
+            <a:off x="2695407" y="301339"/>
+            <a:ext cx="6726602" cy="707886"/>
+          </a:xfrm>
+          <a:prstGeom prst="rect">
+            <a:avLst/>
+          </a:prstGeom>
+          <a:noFill/>
+        </p:spPr>
+        <p:txBody>
+          <a:bodyPr wrap="square" rtlCol="0">
+            <a:spAutoFit/>
+          </a:bodyPr>
+          <a:lstStyle/>
+          <a:p>
+            <a:r>
+              <a:rPr lang="en-US" sz="1000" dirty="0"/>
+              <a:t>Virtual Networking – Cloud – Private</a:t>
+            </a:r>
+          </a:p>
+          <a:p>
+            <a:r>
+              <a:rPr lang="en-US" sz="1000" dirty="0"/>
+              <a:t>      Subnet -  Piece/Part of Whole Network</a:t>
+            </a:r>
+          </a:p>
+          <a:p>
+            <a:r>
+              <a:rPr lang="en-US" sz="1000" dirty="0"/>
+              <a:t>Public Subnet: Web Server</a:t>
+            </a:r>
+          </a:p>
+          <a:p>
+            <a:r>
+              <a:rPr lang="en-US" sz="1000" dirty="0"/>
+              <a:t>Private Subnet: Application, Data Base</a:t>
+            </a:r>
+          </a:p>
+        </p:txBody>
+      </p:sp>
+      <p:cxnSp>
+        <p:nvCxnSpPr>
+          <p:cNvPr id="12" name="Straight Connector 11">
+            <a:extLst>
+              <a:ext uri="{FF2B5EF4-FFF2-40B4-BE49-F238E27FC236}">
+                <a16:creationId xmlns:a16="http://schemas.microsoft.com/office/drawing/2014/main" id="{9034959F-F5AA-444F-B126-D7FC5E874F89}"/>
+              </a:ext>
+            </a:extLst>
+          </p:cNvPr>
+          <p:cNvCxnSpPr/>
+          <p:nvPr/>
+        </p:nvCxnSpPr>
+        <p:spPr>
+          <a:xfrm>
+            <a:off x="1229556" y="3852909"/>
+            <a:ext cx="4136994" cy="0"/>
+          </a:xfrm>
+          <a:prstGeom prst="line">
+            <a:avLst/>
+          </a:prstGeom>
+        </p:spPr>
+        <p:style>
+          <a:lnRef idx="1">
+            <a:schemeClr val="accent1"/>
+          </a:lnRef>
+          <a:fillRef idx="0">
+            <a:schemeClr val="accent1"/>
+          </a:fillRef>
+          <a:effectRef idx="0">
+            <a:schemeClr val="accent1"/>
+          </a:effectRef>
+          <a:fontRef idx="minor">
+            <a:schemeClr val="tx1"/>
+          </a:fontRef>
+        </p:style>
+      </p:cxnSp>
+      <p:sp>
+        <p:nvSpPr>
+          <p:cNvPr id="15" name="TextBox 14">
+            <a:extLst>
+              <a:ext uri="{FF2B5EF4-FFF2-40B4-BE49-F238E27FC236}">
+                <a16:creationId xmlns:a16="http://schemas.microsoft.com/office/drawing/2014/main" id="{7BC677A1-D69D-2A46-BC8A-B6449A056051}"/>
+              </a:ext>
+            </a:extLst>
+          </p:cNvPr>
+          <p:cNvSpPr txBox="1"/>
+          <p:nvPr/>
+        </p:nvSpPr>
+        <p:spPr>
+          <a:xfrm>
+            <a:off x="1229556" y="2622443"/>
+            <a:ext cx="1465851" cy="369332"/>
+          </a:xfrm>
+          <a:prstGeom prst="rect">
+            <a:avLst/>
+          </a:prstGeom>
+          <a:noFill/>
+        </p:spPr>
+        <p:txBody>
+          <a:bodyPr wrap="none" rtlCol="0">
+            <a:spAutoFit/>
+          </a:bodyPr>
+          <a:lstStyle/>
+          <a:p>
+            <a:r>
+              <a:rPr lang="en-US" dirty="0"/>
+              <a:t>Public Subnet</a:t>
+            </a:r>
+          </a:p>
+        </p:txBody>
+      </p:sp>
+      <p:sp>
+        <p:nvSpPr>
+          <p:cNvPr id="16" name="TextBox 15">
+            <a:extLst>
+              <a:ext uri="{FF2B5EF4-FFF2-40B4-BE49-F238E27FC236}">
+                <a16:creationId xmlns:a16="http://schemas.microsoft.com/office/drawing/2014/main" id="{37928AC1-1919-AD47-B2E7-AC8A9C2EC4F1}"/>
+              </a:ext>
+            </a:extLst>
+          </p:cNvPr>
+          <p:cNvSpPr txBox="1"/>
+          <p:nvPr/>
+        </p:nvSpPr>
+        <p:spPr>
+          <a:xfrm>
+            <a:off x="1305017" y="4039340"/>
+            <a:ext cx="1603709" cy="369332"/>
+          </a:xfrm>
+          <a:prstGeom prst="rect">
+            <a:avLst/>
+          </a:prstGeom>
+          <a:noFill/>
+        </p:spPr>
+        <p:txBody>
+          <a:bodyPr wrap="none" rtlCol="0">
+            <a:spAutoFit/>
+          </a:bodyPr>
+          <a:lstStyle/>
+          <a:p>
+            <a:r>
+              <a:rPr lang="en-US" dirty="0"/>
+              <a:t>Private  Subnet</a:t>
+            </a:r>
+          </a:p>
+        </p:txBody>
+      </p:sp>
+      <p:cxnSp>
+        <p:nvCxnSpPr>
+          <p:cNvPr id="18" name="Straight Arrow Connector 17">
+            <a:extLst>
+              <a:ext uri="{FF2B5EF4-FFF2-40B4-BE49-F238E27FC236}">
+                <a16:creationId xmlns:a16="http://schemas.microsoft.com/office/drawing/2014/main" id="{8324E710-74FF-474A-B5CB-277AC3FB1693}"/>
+              </a:ext>
+            </a:extLst>
+          </p:cNvPr>
+          <p:cNvCxnSpPr>
+            <a:cxnSpLocks/>
+          </p:cNvCxnSpPr>
+          <p:nvPr/>
+        </p:nvCxnSpPr>
+        <p:spPr>
+          <a:xfrm>
+            <a:off x="3633830" y="1701839"/>
+            <a:ext cx="0" cy="1316569"/>
+          </a:xfrm>
+          <a:prstGeom prst="straightConnector1">
+            <a:avLst/>
+          </a:prstGeom>
+          <a:ln>
+            <a:tailEnd type="triangle"/>
+          </a:ln>
+        </p:spPr>
+        <p:style>
+          <a:lnRef idx="1">
+            <a:schemeClr val="accent1"/>
+          </a:lnRef>
+          <a:fillRef idx="0">
+            <a:schemeClr val="accent1"/>
+          </a:fillRef>
+          <a:effectRef idx="0">
+            <a:schemeClr val="accent1"/>
+          </a:effectRef>
+          <a:fontRef idx="minor">
+            <a:schemeClr val="tx1"/>
+          </a:fontRef>
+        </p:style>
+      </p:cxnSp>
+      <p:sp>
+        <p:nvSpPr>
+          <p:cNvPr id="19" name="Oval 18">
+            <a:extLst>
+              <a:ext uri="{FF2B5EF4-FFF2-40B4-BE49-F238E27FC236}">
+                <a16:creationId xmlns:a16="http://schemas.microsoft.com/office/drawing/2014/main" id="{E0D05AA3-2869-EE4B-A8AA-FC44BF2C1744}"/>
+              </a:ext>
+            </a:extLst>
+          </p:cNvPr>
+          <p:cNvSpPr/>
+          <p:nvPr/>
+        </p:nvSpPr>
+        <p:spPr>
+          <a:xfrm>
+            <a:off x="3188117" y="2991775"/>
+            <a:ext cx="1188574" cy="683581"/>
+          </a:xfrm>
+          <a:prstGeom prst="ellipse">
+            <a:avLst/>
+          </a:prstGeom>
+        </p:spPr>
+        <p:style>
+          <a:lnRef idx="2">
+            <a:schemeClr val="accent6"/>
+          </a:lnRef>
+          <a:fillRef idx="1">
+            <a:schemeClr val="lt1"/>
+          </a:fillRef>
+          <a:effectRef idx="0">
+            <a:schemeClr val="accent6"/>
+          </a:effectRef>
+          <a:fontRef idx="minor">
+            <a:schemeClr val="dk1"/>
+          </a:fontRef>
+        </p:style>
+        <p:txBody>
+          <a:bodyPr rtlCol="0" anchor="ctr"/>
+          <a:lstStyle/>
+          <a:p>
+            <a:pPr algn="ctr"/>
+            <a:r>
+              <a:rPr lang="en-US" dirty="0"/>
+              <a:t>Web Server</a:t>
+            </a:r>
+          </a:p>
+        </p:txBody>
+      </p:sp>
+      <p:sp>
+        <p:nvSpPr>
+          <p:cNvPr id="22" name="Oval 21">
+            <a:extLst>
+              <a:ext uri="{FF2B5EF4-FFF2-40B4-BE49-F238E27FC236}">
+                <a16:creationId xmlns:a16="http://schemas.microsoft.com/office/drawing/2014/main" id="{A0080861-F41B-0D4B-8B50-08672094F12A}"/>
+              </a:ext>
+            </a:extLst>
+          </p:cNvPr>
+          <p:cNvSpPr/>
+          <p:nvPr/>
+        </p:nvSpPr>
+        <p:spPr>
+          <a:xfrm>
+            <a:off x="3062796" y="4030462"/>
+            <a:ext cx="1807895" cy="692458"/>
+          </a:xfrm>
+          <a:prstGeom prst="ellipse">
+            <a:avLst/>
+          </a:prstGeom>
+        </p:spPr>
+        <p:style>
+          <a:lnRef idx="2">
+            <a:schemeClr val="accent6"/>
+          </a:lnRef>
+          <a:fillRef idx="1">
+            <a:schemeClr val="lt1"/>
+          </a:fillRef>
+          <a:effectRef idx="0">
+            <a:schemeClr val="accent6"/>
+          </a:effectRef>
+          <a:fontRef idx="minor">
+            <a:schemeClr val="dk1"/>
+          </a:fontRef>
+        </p:style>
+        <p:txBody>
+          <a:bodyPr rtlCol="0" anchor="ctr"/>
+          <a:lstStyle/>
+          <a:p>
+            <a:pPr algn="ctr"/>
+            <a:r>
+              <a:rPr lang="en-US" dirty="0"/>
+              <a:t>Application</a:t>
+            </a:r>
+          </a:p>
+        </p:txBody>
+      </p:sp>
+      <p:sp>
+        <p:nvSpPr>
+          <p:cNvPr id="23" name="Can 22">
+            <a:extLst>
+              <a:ext uri="{FF2B5EF4-FFF2-40B4-BE49-F238E27FC236}">
+                <a16:creationId xmlns:a16="http://schemas.microsoft.com/office/drawing/2014/main" id="{33084D53-729F-2342-8924-02D620325E77}"/>
+              </a:ext>
+            </a:extLst>
+          </p:cNvPr>
+          <p:cNvSpPr/>
+          <p:nvPr/>
+        </p:nvSpPr>
+        <p:spPr>
+          <a:xfrm>
+            <a:off x="3782404" y="5051395"/>
+            <a:ext cx="452761" cy="346229"/>
+          </a:xfrm>
+          <a:prstGeom prst="can">
+            <a:avLst/>
+          </a:prstGeom>
+        </p:spPr>
+        <p:style>
+          <a:lnRef idx="2">
+            <a:schemeClr val="accent1">
+              <a:shade val="50000"/>
+            </a:schemeClr>
+          </a:lnRef>
+          <a:fillRef idx="1">
+            <a:schemeClr val="accent1"/>
+          </a:fillRef>
+          <a:effectRef idx="0">
+            <a:schemeClr val="accent1"/>
+          </a:effectRef>
+          <a:fontRef idx="minor">
+            <a:schemeClr val="lt1"/>
+          </a:fontRef>
+        </p:style>
+        <p:txBody>
+          <a:bodyPr rtlCol="0" anchor="ctr"/>
+          <a:lstStyle/>
+          <a:p>
+            <a:pPr algn="ctr"/>
+            <a:r>
+              <a:rPr lang="en-US" dirty="0"/>
+              <a:t>DB</a:t>
+            </a:r>
+          </a:p>
+        </p:txBody>
+      </p:sp>
+      <p:cxnSp>
+        <p:nvCxnSpPr>
+          <p:cNvPr id="25" name="Straight Arrow Connector 24">
+            <a:extLst>
+              <a:ext uri="{FF2B5EF4-FFF2-40B4-BE49-F238E27FC236}">
+                <a16:creationId xmlns:a16="http://schemas.microsoft.com/office/drawing/2014/main" id="{60C3CAA7-1448-BE40-8579-E832E7F0A52F}"/>
+              </a:ext>
+            </a:extLst>
+          </p:cNvPr>
+          <p:cNvCxnSpPr>
+            <a:stCxn id="19" idx="4"/>
+          </p:cNvCxnSpPr>
+          <p:nvPr/>
+        </p:nvCxnSpPr>
+        <p:spPr>
+          <a:xfrm>
+            <a:off x="3782404" y="3675356"/>
+            <a:ext cx="0" cy="363984"/>
+          </a:xfrm>
+          <a:prstGeom prst="straightConnector1">
+            <a:avLst/>
+          </a:prstGeom>
+          <a:ln>
+            <a:tailEnd type="triangle"/>
+          </a:ln>
+        </p:spPr>
+        <p:style>
+          <a:lnRef idx="1">
+            <a:schemeClr val="accent1"/>
+          </a:lnRef>
+          <a:fillRef idx="0">
+            <a:schemeClr val="accent1"/>
+          </a:fillRef>
+          <a:effectRef idx="0">
+            <a:schemeClr val="accent1"/>
+          </a:effectRef>
+          <a:fontRef idx="minor">
+            <a:schemeClr val="tx1"/>
+          </a:fontRef>
+        </p:style>
+      </p:cxnSp>
+      <p:cxnSp>
+        <p:nvCxnSpPr>
+          <p:cNvPr id="27" name="Straight Arrow Connector 26">
+            <a:extLst>
+              <a:ext uri="{FF2B5EF4-FFF2-40B4-BE49-F238E27FC236}">
+                <a16:creationId xmlns:a16="http://schemas.microsoft.com/office/drawing/2014/main" id="{4B628F41-5999-C242-A88B-5F9EA63A30D4}"/>
+              </a:ext>
+            </a:extLst>
+          </p:cNvPr>
+          <p:cNvCxnSpPr>
+            <a:stCxn id="22" idx="4"/>
+            <a:endCxn id="23" idx="1"/>
+          </p:cNvCxnSpPr>
+          <p:nvPr/>
+        </p:nvCxnSpPr>
+        <p:spPr>
+          <a:xfrm>
+            <a:off x="3966744" y="4722920"/>
+            <a:ext cx="42041" cy="328475"/>
+          </a:xfrm>
+          <a:prstGeom prst="straightConnector1">
+            <a:avLst/>
+          </a:prstGeom>
+          <a:ln>
+            <a:tailEnd type="triangle"/>
+          </a:ln>
+        </p:spPr>
+        <p:style>
+          <a:lnRef idx="1">
+            <a:schemeClr val="accent1"/>
+          </a:lnRef>
+          <a:fillRef idx="0">
+            <a:schemeClr val="accent1"/>
+          </a:fillRef>
+          <a:effectRef idx="0">
+            <a:schemeClr val="accent1"/>
+          </a:effectRef>
+          <a:fontRef idx="minor">
+            <a:schemeClr val="tx1"/>
+          </a:fontRef>
+        </p:style>
+      </p:cxnSp>
+      <p:sp>
+        <p:nvSpPr>
+          <p:cNvPr id="28" name="TextBox 27">
+            <a:extLst>
+              <a:ext uri="{FF2B5EF4-FFF2-40B4-BE49-F238E27FC236}">
+                <a16:creationId xmlns:a16="http://schemas.microsoft.com/office/drawing/2014/main" id="{13A61C56-C9DF-B340-89EC-DADD559C57BC}"/>
+              </a:ext>
+            </a:extLst>
+          </p:cNvPr>
+          <p:cNvSpPr txBox="1"/>
+          <p:nvPr/>
+        </p:nvSpPr>
+        <p:spPr>
+          <a:xfrm>
+            <a:off x="4376691" y="3572354"/>
+            <a:ext cx="436338" cy="369332"/>
+          </a:xfrm>
+          <a:prstGeom prst="rect">
+            <a:avLst/>
+          </a:prstGeom>
+          <a:noFill/>
+        </p:spPr>
+        <p:txBody>
+          <a:bodyPr wrap="none" rtlCol="0">
+            <a:spAutoFit/>
+          </a:bodyPr>
+          <a:lstStyle/>
+          <a:p>
+            <a:r>
+              <a:rPr lang="en-US" dirty="0"/>
+              <a:t>SG</a:t>
+            </a:r>
+          </a:p>
+        </p:txBody>
+      </p:sp>
+      <p:sp>
+        <p:nvSpPr>
+          <p:cNvPr id="29" name="Rectangle 28">
+            <a:extLst>
+              <a:ext uri="{FF2B5EF4-FFF2-40B4-BE49-F238E27FC236}">
+                <a16:creationId xmlns:a16="http://schemas.microsoft.com/office/drawing/2014/main" id="{E28D9B73-A157-0E4B-94B1-04ED111B78E2}"/>
+              </a:ext>
+            </a:extLst>
+          </p:cNvPr>
+          <p:cNvSpPr/>
+          <p:nvPr/>
+        </p:nvSpPr>
+        <p:spPr>
+          <a:xfrm>
+            <a:off x="4476395" y="4714044"/>
+            <a:ext cx="436338" cy="369332"/>
+          </a:xfrm>
+          <a:prstGeom prst="rect">
+            <a:avLst/>
+          </a:prstGeom>
+        </p:spPr>
+        <p:txBody>
+          <a:bodyPr wrap="none">
+            <a:spAutoFit/>
+          </a:bodyPr>
+          <a:lstStyle/>
+          <a:p>
+            <a:r>
+              <a:rPr lang="en-US" dirty="0"/>
+              <a:t>SG</a:t>
+            </a:r>
+          </a:p>
+        </p:txBody>
+      </p:sp>
+      <p:sp>
+        <p:nvSpPr>
+          <p:cNvPr id="30" name="TextBox 29">
+            <a:extLst>
+              <a:ext uri="{FF2B5EF4-FFF2-40B4-BE49-F238E27FC236}">
+                <a16:creationId xmlns:a16="http://schemas.microsoft.com/office/drawing/2014/main" id="{B8B3D109-BC89-9E46-99AE-494C23346268}"/>
+              </a:ext>
+            </a:extLst>
+          </p:cNvPr>
+          <p:cNvSpPr txBox="1"/>
+          <p:nvPr/>
+        </p:nvSpPr>
+        <p:spPr>
+          <a:xfrm>
+            <a:off x="3782404" y="1701839"/>
+            <a:ext cx="1093569" cy="369332"/>
+          </a:xfrm>
+          <a:prstGeom prst="rect">
+            <a:avLst/>
+          </a:prstGeom>
+          <a:noFill/>
+        </p:spPr>
+        <p:txBody>
+          <a:bodyPr wrap="none" rtlCol="0">
+            <a:spAutoFit/>
+          </a:bodyPr>
+          <a:lstStyle/>
+          <a:p>
+            <a:r>
+              <a:rPr lang="en-US" dirty="0"/>
+              <a:t>Customer</a:t>
+            </a:r>
+          </a:p>
+        </p:txBody>
+      </p:sp>
+      <p:sp>
+        <p:nvSpPr>
+          <p:cNvPr id="31" name="Frame 30">
+            <a:extLst>
+              <a:ext uri="{FF2B5EF4-FFF2-40B4-BE49-F238E27FC236}">
+                <a16:creationId xmlns:a16="http://schemas.microsoft.com/office/drawing/2014/main" id="{700560D0-5E88-B84E-BF42-517825B11CC6}"/>
+              </a:ext>
+            </a:extLst>
+          </p:cNvPr>
+          <p:cNvSpPr/>
+          <p:nvPr/>
+        </p:nvSpPr>
+        <p:spPr>
+          <a:xfrm>
+            <a:off x="6326332" y="2121763"/>
+            <a:ext cx="5122415" cy="3817398"/>
+          </a:xfrm>
+          <a:prstGeom prst="frame">
+            <a:avLst/>
+          </a:prstGeom>
+        </p:spPr>
+        <p:style>
+          <a:lnRef idx="2">
+            <a:schemeClr val="accent1">
+              <a:shade val="50000"/>
+            </a:schemeClr>
+          </a:lnRef>
+          <a:fillRef idx="1">
+            <a:schemeClr val="accent1"/>
+          </a:fillRef>
+          <a:effectRef idx="0">
+            <a:schemeClr val="accent1"/>
+          </a:effectRef>
+          <a:fontRef idx="minor">
+            <a:schemeClr val="lt1"/>
+          </a:fontRef>
+        </p:style>
+        <p:txBody>
+          <a:bodyPr rtlCol="0" anchor="ctr"/>
+          <a:lstStyle/>
+          <a:p>
+            <a:pPr algn="ctr"/>
+            <a:endParaRPr lang="en-US" dirty="0">
+              <a:solidFill>
+                <a:schemeClr val="tx1"/>
+              </a:solidFill>
+            </a:endParaRPr>
+          </a:p>
+        </p:txBody>
+      </p:sp>
+      <p:cxnSp>
+        <p:nvCxnSpPr>
+          <p:cNvPr id="32" name="Straight Connector 31">
+            <a:extLst>
+              <a:ext uri="{FF2B5EF4-FFF2-40B4-BE49-F238E27FC236}">
+                <a16:creationId xmlns:a16="http://schemas.microsoft.com/office/drawing/2014/main" id="{C567F3A6-C01F-0A4D-A206-67C00DDD5E5F}"/>
+              </a:ext>
+            </a:extLst>
+          </p:cNvPr>
+          <p:cNvCxnSpPr/>
+          <p:nvPr/>
+        </p:nvCxnSpPr>
+        <p:spPr>
+          <a:xfrm>
+            <a:off x="6869161" y="3879542"/>
+            <a:ext cx="4136994" cy="0"/>
+          </a:xfrm>
+          <a:prstGeom prst="line">
+            <a:avLst/>
+          </a:prstGeom>
+        </p:spPr>
+        <p:style>
+          <a:lnRef idx="1">
+            <a:schemeClr val="accent1"/>
+          </a:lnRef>
+          <a:fillRef idx="0">
+            <a:schemeClr val="accent1"/>
+          </a:fillRef>
+          <a:effectRef idx="0">
+            <a:schemeClr val="accent1"/>
+          </a:effectRef>
+          <a:fontRef idx="minor">
+            <a:schemeClr val="tx1"/>
+          </a:fontRef>
+        </p:style>
+      </p:cxnSp>
+      <p:sp>
+        <p:nvSpPr>
+          <p:cNvPr id="33" name="TextBox 32">
+            <a:extLst>
+              <a:ext uri="{FF2B5EF4-FFF2-40B4-BE49-F238E27FC236}">
+                <a16:creationId xmlns:a16="http://schemas.microsoft.com/office/drawing/2014/main" id="{C1723E35-7190-B648-B506-5DAD5BA5AB40}"/>
+              </a:ext>
+            </a:extLst>
+          </p:cNvPr>
+          <p:cNvSpPr txBox="1"/>
+          <p:nvPr/>
+        </p:nvSpPr>
+        <p:spPr>
+          <a:xfrm>
+            <a:off x="6869161" y="2649076"/>
+            <a:ext cx="1465851" cy="369332"/>
+          </a:xfrm>
+          <a:prstGeom prst="rect">
+            <a:avLst/>
+          </a:prstGeom>
+          <a:noFill/>
+        </p:spPr>
+        <p:txBody>
+          <a:bodyPr wrap="none" rtlCol="0">
+            <a:spAutoFit/>
+          </a:bodyPr>
+          <a:lstStyle/>
+          <a:p>
+            <a:r>
+              <a:rPr lang="en-US" dirty="0"/>
+              <a:t>Public Subnet</a:t>
+            </a:r>
+          </a:p>
+        </p:txBody>
+      </p:sp>
+      <p:sp>
+        <p:nvSpPr>
+          <p:cNvPr id="34" name="TextBox 33">
+            <a:extLst>
+              <a:ext uri="{FF2B5EF4-FFF2-40B4-BE49-F238E27FC236}">
+                <a16:creationId xmlns:a16="http://schemas.microsoft.com/office/drawing/2014/main" id="{33801579-2B59-C14D-9ADC-F8F85B850B6E}"/>
+              </a:ext>
+            </a:extLst>
+          </p:cNvPr>
+          <p:cNvSpPr txBox="1"/>
+          <p:nvPr/>
+        </p:nvSpPr>
+        <p:spPr>
+          <a:xfrm>
+            <a:off x="6944622" y="4065973"/>
+            <a:ext cx="1603709" cy="369332"/>
+          </a:xfrm>
+          <a:prstGeom prst="rect">
+            <a:avLst/>
+          </a:prstGeom>
+          <a:noFill/>
+        </p:spPr>
+        <p:txBody>
+          <a:bodyPr wrap="none" rtlCol="0">
+            <a:spAutoFit/>
+          </a:bodyPr>
+          <a:lstStyle/>
+          <a:p>
+            <a:r>
+              <a:rPr lang="en-US" dirty="0"/>
+              <a:t>Private  Subnet</a:t>
+            </a:r>
+          </a:p>
+        </p:txBody>
+      </p:sp>
+      <p:cxnSp>
+        <p:nvCxnSpPr>
+          <p:cNvPr id="35" name="Straight Arrow Connector 34">
+            <a:extLst>
+              <a:ext uri="{FF2B5EF4-FFF2-40B4-BE49-F238E27FC236}">
+                <a16:creationId xmlns:a16="http://schemas.microsoft.com/office/drawing/2014/main" id="{E95AB327-8181-5143-AE8B-C94F6B263598}"/>
+              </a:ext>
+            </a:extLst>
+          </p:cNvPr>
+          <p:cNvCxnSpPr>
+            <a:cxnSpLocks/>
+          </p:cNvCxnSpPr>
+          <p:nvPr/>
+        </p:nvCxnSpPr>
+        <p:spPr>
+          <a:xfrm>
+            <a:off x="9273435" y="1728472"/>
+            <a:ext cx="0" cy="1316569"/>
+          </a:xfrm>
+          <a:prstGeom prst="straightConnector1">
+            <a:avLst/>
+          </a:prstGeom>
+          <a:ln>
+            <a:tailEnd type="triangle"/>
+          </a:ln>
+        </p:spPr>
+        <p:style>
+          <a:lnRef idx="1">
+            <a:schemeClr val="accent1"/>
+          </a:lnRef>
+          <a:fillRef idx="0">
+            <a:schemeClr val="accent1"/>
+          </a:fillRef>
+          <a:effectRef idx="0">
+            <a:schemeClr val="accent1"/>
+          </a:effectRef>
+          <a:fontRef idx="minor">
+            <a:schemeClr val="tx1"/>
+          </a:fontRef>
+        </p:style>
+      </p:cxnSp>
+      <p:sp>
+        <p:nvSpPr>
+          <p:cNvPr id="36" name="Oval 35">
+            <a:extLst>
+              <a:ext uri="{FF2B5EF4-FFF2-40B4-BE49-F238E27FC236}">
+                <a16:creationId xmlns:a16="http://schemas.microsoft.com/office/drawing/2014/main" id="{706E0095-FF0D-914C-A94E-FB6ACA6E5462}"/>
+              </a:ext>
+            </a:extLst>
+          </p:cNvPr>
+          <p:cNvSpPr/>
+          <p:nvPr/>
+        </p:nvSpPr>
+        <p:spPr>
+          <a:xfrm>
+            <a:off x="8827722" y="3018408"/>
+            <a:ext cx="1188574" cy="683581"/>
+          </a:xfrm>
+          <a:prstGeom prst="ellipse">
+            <a:avLst/>
+          </a:prstGeom>
+        </p:spPr>
+        <p:style>
+          <a:lnRef idx="2">
+            <a:schemeClr val="accent6"/>
+          </a:lnRef>
+          <a:fillRef idx="1">
+            <a:schemeClr val="lt1"/>
+          </a:fillRef>
+          <a:effectRef idx="0">
+            <a:schemeClr val="accent6"/>
+          </a:effectRef>
+          <a:fontRef idx="minor">
+            <a:schemeClr val="dk1"/>
+          </a:fontRef>
+        </p:style>
+        <p:txBody>
+          <a:bodyPr rtlCol="0" anchor="ctr"/>
+          <a:lstStyle/>
+          <a:p>
+            <a:pPr algn="ctr"/>
+            <a:r>
+              <a:rPr lang="en-US" dirty="0"/>
+              <a:t>Web Server</a:t>
+            </a:r>
+          </a:p>
+        </p:txBody>
+      </p:sp>
+      <p:sp>
+        <p:nvSpPr>
+          <p:cNvPr id="37" name="Oval 36">
+            <a:extLst>
+              <a:ext uri="{FF2B5EF4-FFF2-40B4-BE49-F238E27FC236}">
+                <a16:creationId xmlns:a16="http://schemas.microsoft.com/office/drawing/2014/main" id="{0F1DF2C6-D499-2947-A0C1-1BEC58BDB1FC}"/>
+              </a:ext>
+            </a:extLst>
+          </p:cNvPr>
+          <p:cNvSpPr/>
+          <p:nvPr/>
+        </p:nvSpPr>
+        <p:spPr>
+          <a:xfrm>
+            <a:off x="8702401" y="4057095"/>
+            <a:ext cx="1807895" cy="692458"/>
+          </a:xfrm>
+          <a:prstGeom prst="ellipse">
+            <a:avLst/>
+          </a:prstGeom>
+        </p:spPr>
+        <p:style>
+          <a:lnRef idx="2">
+            <a:schemeClr val="accent6"/>
+          </a:lnRef>
+          <a:fillRef idx="1">
+            <a:schemeClr val="lt1"/>
+          </a:fillRef>
+          <a:effectRef idx="0">
+            <a:schemeClr val="accent6"/>
+          </a:effectRef>
+          <a:fontRef idx="minor">
+            <a:schemeClr val="dk1"/>
+          </a:fontRef>
+        </p:style>
+        <p:txBody>
+          <a:bodyPr rtlCol="0" anchor="ctr"/>
+          <a:lstStyle/>
+          <a:p>
+            <a:pPr algn="ctr"/>
+            <a:r>
+              <a:rPr lang="en-US" dirty="0"/>
+              <a:t>Application</a:t>
+            </a:r>
+          </a:p>
+        </p:txBody>
+      </p:sp>
+      <p:sp>
+        <p:nvSpPr>
+          <p:cNvPr id="38" name="Can 37">
+            <a:extLst>
+              <a:ext uri="{FF2B5EF4-FFF2-40B4-BE49-F238E27FC236}">
+                <a16:creationId xmlns:a16="http://schemas.microsoft.com/office/drawing/2014/main" id="{CA42F886-BA42-2346-A732-781D279E743A}"/>
+              </a:ext>
+            </a:extLst>
+          </p:cNvPr>
+          <p:cNvSpPr/>
+          <p:nvPr/>
+        </p:nvSpPr>
+        <p:spPr>
+          <a:xfrm>
+            <a:off x="9422009" y="5078028"/>
+            <a:ext cx="452761" cy="346229"/>
+          </a:xfrm>
+          <a:prstGeom prst="can">
+            <a:avLst/>
+          </a:prstGeom>
+        </p:spPr>
+        <p:style>
+          <a:lnRef idx="2">
+            <a:schemeClr val="accent1">
+              <a:shade val="50000"/>
+            </a:schemeClr>
+          </a:lnRef>
+          <a:fillRef idx="1">
+            <a:schemeClr val="accent1"/>
+          </a:fillRef>
+          <a:effectRef idx="0">
+            <a:schemeClr val="accent1"/>
+          </a:effectRef>
+          <a:fontRef idx="minor">
+            <a:schemeClr val="lt1"/>
+          </a:fontRef>
+        </p:style>
+        <p:txBody>
+          <a:bodyPr rtlCol="0" anchor="ctr"/>
+          <a:lstStyle/>
+          <a:p>
+            <a:pPr algn="ctr"/>
+            <a:r>
+              <a:rPr lang="en-US" dirty="0"/>
+              <a:t>DB</a:t>
+            </a:r>
+          </a:p>
+        </p:txBody>
+      </p:sp>
+      <p:sp>
+        <p:nvSpPr>
+          <p:cNvPr id="39" name="TextBox 38">
+            <a:extLst>
+              <a:ext uri="{FF2B5EF4-FFF2-40B4-BE49-F238E27FC236}">
+                <a16:creationId xmlns:a16="http://schemas.microsoft.com/office/drawing/2014/main" id="{683DD4FA-B8C7-B041-A75F-FB4E477F50C2}"/>
+              </a:ext>
+            </a:extLst>
+          </p:cNvPr>
+          <p:cNvSpPr txBox="1"/>
+          <p:nvPr/>
+        </p:nvSpPr>
+        <p:spPr>
+          <a:xfrm>
+            <a:off x="10016296" y="3598987"/>
+            <a:ext cx="436338" cy="369332"/>
+          </a:xfrm>
+          <a:prstGeom prst="rect">
+            <a:avLst/>
+          </a:prstGeom>
+          <a:noFill/>
+        </p:spPr>
+        <p:txBody>
+          <a:bodyPr wrap="none" rtlCol="0">
+            <a:spAutoFit/>
+          </a:bodyPr>
+          <a:lstStyle/>
+          <a:p>
+            <a:r>
+              <a:rPr lang="en-US" dirty="0"/>
+              <a:t>SG</a:t>
+            </a:r>
+          </a:p>
+        </p:txBody>
+      </p:sp>
+      <p:sp>
+        <p:nvSpPr>
+          <p:cNvPr id="40" name="Rectangle 39">
+            <a:extLst>
+              <a:ext uri="{FF2B5EF4-FFF2-40B4-BE49-F238E27FC236}">
+                <a16:creationId xmlns:a16="http://schemas.microsoft.com/office/drawing/2014/main" id="{695F43F9-73B8-1A4F-B868-4D726F76339D}"/>
+              </a:ext>
+            </a:extLst>
+          </p:cNvPr>
+          <p:cNvSpPr/>
+          <p:nvPr/>
+        </p:nvSpPr>
+        <p:spPr>
+          <a:xfrm>
+            <a:off x="10116000" y="4740677"/>
+            <a:ext cx="436338" cy="369332"/>
+          </a:xfrm>
+          <a:prstGeom prst="rect">
+            <a:avLst/>
+          </a:prstGeom>
+        </p:spPr>
+        <p:txBody>
+          <a:bodyPr wrap="none">
+            <a:spAutoFit/>
+          </a:bodyPr>
+          <a:lstStyle/>
+          <a:p>
+            <a:r>
+              <a:rPr lang="en-US" dirty="0"/>
+              <a:t>SG</a:t>
+            </a:r>
+          </a:p>
+        </p:txBody>
+      </p:sp>
+      <p:sp>
+        <p:nvSpPr>
+          <p:cNvPr id="41" name="TextBox 40">
+            <a:extLst>
+              <a:ext uri="{FF2B5EF4-FFF2-40B4-BE49-F238E27FC236}">
+                <a16:creationId xmlns:a16="http://schemas.microsoft.com/office/drawing/2014/main" id="{3C743783-9A3D-DA46-9D13-794D9C4738BE}"/>
+              </a:ext>
+            </a:extLst>
+          </p:cNvPr>
+          <p:cNvSpPr txBox="1"/>
+          <p:nvPr/>
+        </p:nvSpPr>
+        <p:spPr>
+          <a:xfrm>
+            <a:off x="9422009" y="1728472"/>
+            <a:ext cx="1093569" cy="369332"/>
+          </a:xfrm>
+          <a:prstGeom prst="rect">
+            <a:avLst/>
+          </a:prstGeom>
+          <a:noFill/>
+        </p:spPr>
+        <p:txBody>
+          <a:bodyPr wrap="none" rtlCol="0">
+            <a:spAutoFit/>
+          </a:bodyPr>
+          <a:lstStyle/>
+          <a:p>
+            <a:r>
+              <a:rPr lang="en-US" dirty="0"/>
+              <a:t>Customer</a:t>
+            </a:r>
+          </a:p>
+        </p:txBody>
+      </p:sp>
+      <p:sp>
+        <p:nvSpPr>
+          <p:cNvPr id="43" name="TextBox 42">
+            <a:extLst>
+              <a:ext uri="{FF2B5EF4-FFF2-40B4-BE49-F238E27FC236}">
+                <a16:creationId xmlns:a16="http://schemas.microsoft.com/office/drawing/2014/main" id="{8C810252-0966-6541-BA84-2BFEEF82E56E}"/>
+              </a:ext>
+            </a:extLst>
+          </p:cNvPr>
+          <p:cNvSpPr txBox="1"/>
+          <p:nvPr/>
+        </p:nvSpPr>
+        <p:spPr>
+          <a:xfrm>
+            <a:off x="2539014" y="6214369"/>
+            <a:ext cx="1226618" cy="369332"/>
+          </a:xfrm>
+          <a:prstGeom prst="rect">
+            <a:avLst/>
+          </a:prstGeom>
+          <a:noFill/>
+        </p:spPr>
+        <p:txBody>
+          <a:bodyPr wrap="none" rtlCol="0">
+            <a:spAutoFit/>
+          </a:bodyPr>
+          <a:lstStyle/>
+          <a:p>
+            <a:r>
+              <a:rPr lang="en-US" dirty="0"/>
+              <a:t>AZ1 - KPHB</a:t>
+            </a:r>
+          </a:p>
+        </p:txBody>
+      </p:sp>
+      <p:sp>
+        <p:nvSpPr>
+          <p:cNvPr id="44" name="TextBox 43">
+            <a:extLst>
+              <a:ext uri="{FF2B5EF4-FFF2-40B4-BE49-F238E27FC236}">
+                <a16:creationId xmlns:a16="http://schemas.microsoft.com/office/drawing/2014/main" id="{7D0B04C7-FF90-C342-8F29-49DBF033C51E}"/>
+              </a:ext>
+            </a:extLst>
+          </p:cNvPr>
+          <p:cNvSpPr txBox="1"/>
+          <p:nvPr/>
+        </p:nvSpPr>
+        <p:spPr>
+          <a:xfrm>
+            <a:off x="8134904" y="6214369"/>
+            <a:ext cx="1317027" cy="369332"/>
+          </a:xfrm>
+          <a:prstGeom prst="rect">
+            <a:avLst/>
+          </a:prstGeom>
+          <a:noFill/>
+        </p:spPr>
+        <p:txBody>
+          <a:bodyPr wrap="none" rtlCol="0">
+            <a:spAutoFit/>
+          </a:bodyPr>
+          <a:lstStyle/>
+          <a:p>
+            <a:r>
+              <a:rPr lang="en-US" dirty="0"/>
+              <a:t>AZ2 - UPPAL</a:t>
+            </a:r>
+          </a:p>
+        </p:txBody>
+      </p:sp>
+      <p:sp>
+        <p:nvSpPr>
+          <p:cNvPr id="46" name="Frame 45">
+            <a:extLst>
+              <a:ext uri="{FF2B5EF4-FFF2-40B4-BE49-F238E27FC236}">
+                <a16:creationId xmlns:a16="http://schemas.microsoft.com/office/drawing/2014/main" id="{2166FAA8-5D1A-7B4D-9831-7EF7F4C3C1A5}"/>
+              </a:ext>
+            </a:extLst>
+          </p:cNvPr>
+          <p:cNvSpPr/>
+          <p:nvPr/>
+        </p:nvSpPr>
+        <p:spPr>
+          <a:xfrm>
+            <a:off x="372862" y="1580225"/>
+            <a:ext cx="11567604" cy="5655076"/>
+          </a:xfrm>
+          <a:prstGeom prst="frame">
+            <a:avLst/>
+          </a:prstGeom>
+        </p:spPr>
+        <p:style>
+          <a:lnRef idx="2">
+            <a:schemeClr val="accent6"/>
+          </a:lnRef>
+          <a:fillRef idx="1">
+            <a:schemeClr val="lt1"/>
+          </a:fillRef>
+          <a:effectRef idx="0">
+            <a:schemeClr val="accent6"/>
+          </a:effectRef>
+          <a:fontRef idx="minor">
+            <a:schemeClr val="dk1"/>
+          </a:fontRef>
+        </p:style>
+        <p:txBody>
+          <a:bodyPr rtlCol="0" anchor="ctr"/>
+          <a:lstStyle/>
+          <a:p>
+            <a:pPr algn="ctr"/>
+            <a:endParaRPr lang="en-US" dirty="0">
+              <a:solidFill>
+                <a:schemeClr val="tx1"/>
+              </a:solidFill>
+            </a:endParaRPr>
+          </a:p>
+        </p:txBody>
+      </p:sp>
+      <p:sp>
+        <p:nvSpPr>
+          <p:cNvPr id="47" name="TextBox 46">
+            <a:extLst>
+              <a:ext uri="{FF2B5EF4-FFF2-40B4-BE49-F238E27FC236}">
+                <a16:creationId xmlns:a16="http://schemas.microsoft.com/office/drawing/2014/main" id="{1F20B82B-A994-C145-93C9-57687F856063}"/>
+              </a:ext>
+            </a:extLst>
+          </p:cNvPr>
+          <p:cNvSpPr txBox="1"/>
+          <p:nvPr/>
+        </p:nvSpPr>
+        <p:spPr>
+          <a:xfrm>
+            <a:off x="5366550" y="1251750"/>
+            <a:ext cx="1902829" cy="369332"/>
+          </a:xfrm>
+          <a:prstGeom prst="rect">
+            <a:avLst/>
+          </a:prstGeom>
+          <a:noFill/>
+        </p:spPr>
+        <p:txBody>
+          <a:bodyPr wrap="none" rtlCol="0">
+            <a:spAutoFit/>
+          </a:bodyPr>
+          <a:lstStyle/>
+          <a:p>
+            <a:r>
+              <a:rPr lang="en-US" dirty="0"/>
+              <a:t>Hyderabad Region</a:t>
+            </a:r>
+          </a:p>
+        </p:txBody>
+      </p:sp>
+      <p:sp>
+        <p:nvSpPr>
+          <p:cNvPr id="48" name="Rectangle 47">
+            <a:extLst>
+              <a:ext uri="{FF2B5EF4-FFF2-40B4-BE49-F238E27FC236}">
+                <a16:creationId xmlns:a16="http://schemas.microsoft.com/office/drawing/2014/main" id="{FBE8B6E7-ED1E-124E-AF97-C72DFF6407A6}"/>
+              </a:ext>
+            </a:extLst>
+          </p:cNvPr>
+          <p:cNvSpPr/>
+          <p:nvPr/>
+        </p:nvSpPr>
+        <p:spPr>
+          <a:xfrm>
+            <a:off x="4329188" y="6828078"/>
+            <a:ext cx="1851212" cy="584775"/>
+          </a:xfrm>
+          <a:prstGeom prst="rect">
+            <a:avLst/>
+          </a:prstGeom>
+        </p:spPr>
+        <p:txBody>
+          <a:bodyPr wrap="none">
+            <a:spAutoFit/>
+          </a:bodyPr>
+          <a:lstStyle/>
+          <a:p>
+            <a:r>
+              <a:rPr lang="en-US" sz="1400" b="1" dirty="0"/>
+              <a:t>Running Notes in class</a:t>
+            </a:r>
+          </a:p>
+          <a:p>
+            <a:endParaRPr lang="en-US" dirty="0"/>
+          </a:p>
+        </p:txBody>
+      </p:sp>
+    </p:spTree>
+    <p:extLst>
+      <p:ext uri="{BB962C8B-B14F-4D97-AF65-F5344CB8AC3E}">
+        <p14:creationId xmlns:p14="http://schemas.microsoft.com/office/powerpoint/2010/main" val="3049661956"/>
+      </p:ext>
+    </p:extLst>
+  </p:cSld>
+  <p:clrMapOvr>
+    <a:masterClrMapping/>
+  </p:clrMapOvr>
+</p:sld>
+</file>
+
 <file path=ppt/slides/slide2.xml><?xml version="1.0" encoding="utf-8"?>
 <p:sld xmlns:a="http://schemas.openxmlformats.org/drawingml/2006/main" xmlns:r="http://schemas.openxmlformats.org/officeDocument/2006/relationships" xmlns:p="http://schemas.openxmlformats.org/presentationml/2006/main">
   <p:cSld>
@@ -4498,7 +6585,7 @@
         <p:spPr>
           <a:xfrm>
             <a:off x="262758" y="1166649"/>
-            <a:ext cx="11081239" cy="3877985"/>
+            <a:ext cx="11369779" cy="3877985"/>
           </a:xfrm>
           <a:prstGeom prst="rect">
             <a:avLst/>
@@ -4511,8 +6598,9 @@
           </a:bodyPr>
           <a:lstStyle/>
           <a:p>
-            <a:r>
-              <a:rPr lang="en-IN" b="1">
+            <a:pPr lvl="1"/>
+            <a:r>
+              <a:rPr lang="en-IN" b="1" dirty="0">
                 <a:solidFill>
                   <a:srgbClr val="666666"/>
                 </a:solidFill>
@@ -4520,33 +6608,26 @@
               </a:rPr>
               <a:t>Subnet:</a:t>
             </a:r>
-            <a:br>
-              <a:rPr lang="en-IN">
+          </a:p>
+          <a:p>
+            <a:pPr lvl="1"/>
+            <a:r>
+              <a:rPr lang="en-IN" dirty="0">
                 <a:solidFill>
                   <a:srgbClr val="666666"/>
                 </a:solidFill>
                 <a:latin typeface="Roboto Slab"/>
               </a:rPr>
-            </a:br>
-            <a:r>
-              <a:rPr lang="en-IN">
-                <a:solidFill>
-                  <a:srgbClr val="666666"/>
-                </a:solidFill>
-                <a:latin typeface="Roboto Slab"/>
-              </a:rPr>
-              <a:t>A subnet, or subnetwork, is a segmented piece of a larger network</a:t>
-            </a:r>
-            <a:br>
-              <a:rPr lang="en-IN">
-                <a:solidFill>
-                  <a:srgbClr val="666666"/>
-                </a:solidFill>
-                <a:latin typeface="Roboto Slab"/>
-              </a:rPr>
-            </a:br>
-            <a:r>
-              <a:rPr lang="en-IN">
+              <a:t>              A subnet, or subnetwork, is a segmented piece of a larger network</a:t>
+            </a:r>
+          </a:p>
+          <a:p>
+            <a:pPr marL="285750" indent="-285750">
+              <a:buFont typeface="Arial" panose="020B0604020202020204" pitchFamily="34" charset="0"/>
+              <a:buChar char="•"/>
+            </a:pPr>
+            <a:r>
+              <a:rPr lang="en-IN" dirty="0">
                 <a:solidFill>
                   <a:srgbClr val="666666"/>
                 </a:solidFill>
@@ -4554,16 +6635,14 @@
               </a:rPr>
               <a:t>You can launch AWS resources, such as EC2 instances, into a specific subnet</a:t>
             </a:r>
-            <a:br>
-              <a:rPr lang="en-IN">
-                <a:solidFill>
-                  <a:srgbClr val="666666"/>
-                </a:solidFill>
-                <a:latin typeface="Roboto Slab"/>
-              </a:rPr>
-            </a:br>
-            <a:r>
-              <a:rPr lang="en-IN">
+          </a:p>
+          <a:p>
+            <a:pPr marL="285750" indent="-285750">
+              <a:buFont typeface="Arial" panose="020B0604020202020204" pitchFamily="34" charset="0"/>
+              <a:buChar char="•"/>
+            </a:pPr>
+            <a:r>
+              <a:rPr lang="en-IN" dirty="0">
                 <a:solidFill>
                   <a:srgbClr val="666666"/>
                 </a:solidFill>
@@ -4573,8 +6652,12 @@
             </a:r>
           </a:p>
           <a:p>
-            <a:r>
-              <a:rPr lang="en-IN" sz="1600">
+            <a:pPr marL="285750" indent="-285750">
+              <a:buFont typeface="Arial" panose="020B0604020202020204" pitchFamily="34" charset="0"/>
+              <a:buChar char="•"/>
+            </a:pPr>
+            <a:r>
+              <a:rPr lang="en-IN" sz="1600" dirty="0">
                 <a:solidFill>
                   <a:srgbClr val="666666"/>
                 </a:solidFill>
@@ -4583,57 +6666,56 @@
               <a:t>By launching instances in separate Availability Zones,  you can protect your applications from the failure of a single zone</a:t>
             </a:r>
             <a:br>
-              <a:rPr lang="en-IN" sz="1600"/>
+              <a:rPr lang="en-IN" sz="1600" dirty="0"/>
             </a:br>
-            <a:endParaRPr lang="en-IN" sz="1600"/>
-          </a:p>
-          <a:p>
-            <a:endParaRPr lang="en-IN" sz="1600"/>
-          </a:p>
-          <a:p>
-            <a:r>
-              <a:rPr lang="en-IN" b="1"/>
+            <a:endParaRPr lang="en-IN" sz="1600" dirty="0"/>
+          </a:p>
+          <a:p>
+            <a:endParaRPr lang="en-IN" sz="1600" dirty="0"/>
+          </a:p>
+          <a:p>
+            <a:r>
+              <a:rPr lang="en-IN" b="1" dirty="0"/>
               <a:t>Public subnet</a:t>
             </a:r>
             <a:r>
-              <a:rPr lang="en-IN"/>
+              <a:rPr lang="en-IN" dirty="0"/>
               <a:t>: </a:t>
             </a:r>
           </a:p>
           <a:p>
             <a:r>
-              <a:rPr lang="en-IN"/>
+              <a:rPr lang="en-IN" dirty="0"/>
               <a:t>A public subnet will be used for instances that need a public IP to be accessible from the internet</a:t>
             </a:r>
           </a:p>
           <a:p>
             <a:r>
-              <a:rPr lang="en-IN"/>
+              <a:rPr lang="en-IN" dirty="0"/>
               <a:t>Example Webservers </a:t>
             </a:r>
           </a:p>
           <a:p>
-            <a:endParaRPr lang="en-IN"/>
-          </a:p>
-          <a:p>
-            <a:r>
-              <a:rPr lang="en-IN" b="1"/>
+            <a:endParaRPr lang="en-IN" dirty="0"/>
+          </a:p>
+          <a:p>
+            <a:r>
+              <a:rPr lang="en-IN" b="1" dirty="0"/>
               <a:t>Private subnet</a:t>
             </a:r>
-            <a:endParaRPr lang="en-IN"/>
-          </a:p>
-          <a:p>
-            <a:r>
-              <a:rPr lang="en-IN"/>
+            <a:endParaRPr lang="en-IN" dirty="0"/>
+          </a:p>
+          <a:p>
+            <a:r>
+              <a:rPr lang="en-IN" dirty="0"/>
               <a:t>A private subnet is used for instances that do not need to be directly reachable from the internet</a:t>
             </a:r>
           </a:p>
           <a:p>
             <a:r>
-              <a:rPr lang="en-IN"/>
+              <a:rPr lang="en-IN" dirty="0"/>
               <a:t>For the best security, it's important to keep backend instances and databases private subnet</a:t>
             </a:r>
-            <a:endParaRPr lang="en-IN" dirty="0"/>
           </a:p>
         </p:txBody>
       </p:sp>
@@ -4793,533 +6875,70 @@
       </p:grpSpPr>
       <p:sp>
         <p:nvSpPr>
-          <p:cNvPr id="5" name="Frame 4">
-            <a:extLst>
-              <a:ext uri="{FF2B5EF4-FFF2-40B4-BE49-F238E27FC236}">
-                <a16:creationId xmlns:a16="http://schemas.microsoft.com/office/drawing/2014/main" id="{E873FC54-21EC-424B-81C7-45E24006E66E}"/>
-              </a:ext>
-            </a:extLst>
-          </p:cNvPr>
-          <p:cNvSpPr/>
-          <p:nvPr/>
-        </p:nvSpPr>
-        <p:spPr>
-          <a:xfrm>
-            <a:off x="1518082" y="1180730"/>
-            <a:ext cx="4216893" cy="4119239"/>
-          </a:xfrm>
-          <a:prstGeom prst="frame">
-            <a:avLst/>
-          </a:prstGeom>
-        </p:spPr>
-        <p:style>
-          <a:lnRef idx="2">
-            <a:schemeClr val="accent1">
-              <a:shade val="50000"/>
-            </a:schemeClr>
-          </a:lnRef>
-          <a:fillRef idx="1">
-            <a:schemeClr val="accent1"/>
-          </a:fillRef>
-          <a:effectRef idx="0">
-            <a:schemeClr val="accent1"/>
-          </a:effectRef>
-          <a:fontRef idx="minor">
-            <a:schemeClr val="lt1"/>
-          </a:fontRef>
-        </p:style>
-        <p:txBody>
-          <a:bodyPr rtlCol="0" anchor="ctr"/>
-          <a:lstStyle/>
-          <a:p>
-            <a:pPr algn="ctr"/>
-            <a:endParaRPr lang="en-US">
-              <a:solidFill>
-                <a:schemeClr val="tx1"/>
-              </a:solidFill>
-            </a:endParaRPr>
-          </a:p>
-        </p:txBody>
-      </p:sp>
-      <p:sp>
-        <p:nvSpPr>
-          <p:cNvPr id="6" name="Frame 5">
-            <a:extLst>
-              <a:ext uri="{FF2B5EF4-FFF2-40B4-BE49-F238E27FC236}">
-                <a16:creationId xmlns:a16="http://schemas.microsoft.com/office/drawing/2014/main" id="{0BB8B278-637C-E841-BC72-72BB64C3FE2B}"/>
-              </a:ext>
-            </a:extLst>
-          </p:cNvPr>
-          <p:cNvSpPr/>
-          <p:nvPr/>
-        </p:nvSpPr>
-        <p:spPr>
-          <a:xfrm>
-            <a:off x="6968971" y="1331650"/>
-            <a:ext cx="4305670" cy="3968319"/>
-          </a:xfrm>
-          <a:prstGeom prst="frame">
-            <a:avLst/>
-          </a:prstGeom>
-        </p:spPr>
-        <p:style>
-          <a:lnRef idx="2">
-            <a:schemeClr val="accent1">
-              <a:shade val="50000"/>
-            </a:schemeClr>
-          </a:lnRef>
-          <a:fillRef idx="1">
-            <a:schemeClr val="accent1"/>
-          </a:fillRef>
-          <a:effectRef idx="0">
-            <a:schemeClr val="accent1"/>
-          </a:effectRef>
-          <a:fontRef idx="minor">
-            <a:schemeClr val="lt1"/>
-          </a:fontRef>
-        </p:style>
-        <p:txBody>
-          <a:bodyPr rtlCol="0" anchor="ctr"/>
-          <a:lstStyle/>
-          <a:p>
-            <a:pPr algn="ctr"/>
-            <a:endParaRPr lang="en-US">
-              <a:solidFill>
-                <a:schemeClr val="tx1"/>
-              </a:solidFill>
-            </a:endParaRPr>
-          </a:p>
-        </p:txBody>
-      </p:sp>
-      <p:sp>
-        <p:nvSpPr>
-          <p:cNvPr id="7" name="Frame 6">
-            <a:extLst>
-              <a:ext uri="{FF2B5EF4-FFF2-40B4-BE49-F238E27FC236}">
-                <a16:creationId xmlns:a16="http://schemas.microsoft.com/office/drawing/2014/main" id="{1053D7AE-A7D7-5E46-8271-C90993313888}"/>
-              </a:ext>
-            </a:extLst>
-          </p:cNvPr>
-          <p:cNvSpPr/>
-          <p:nvPr/>
-        </p:nvSpPr>
-        <p:spPr>
-          <a:xfrm>
-            <a:off x="529701" y="239696"/>
-            <a:ext cx="11662299" cy="6001305"/>
-          </a:xfrm>
-          <a:prstGeom prst="frame">
-            <a:avLst/>
-          </a:prstGeom>
-        </p:spPr>
-        <p:style>
-          <a:lnRef idx="2">
-            <a:schemeClr val="accent1">
-              <a:shade val="50000"/>
-            </a:schemeClr>
-          </a:lnRef>
-          <a:fillRef idx="1">
-            <a:schemeClr val="accent1"/>
-          </a:fillRef>
-          <a:effectRef idx="0">
-            <a:schemeClr val="accent1"/>
-          </a:effectRef>
-          <a:fontRef idx="minor">
-            <a:schemeClr val="lt1"/>
-          </a:fontRef>
-        </p:style>
-        <p:txBody>
-          <a:bodyPr rtlCol="0" anchor="ctr"/>
-          <a:lstStyle/>
-          <a:p>
-            <a:pPr algn="ctr"/>
-            <a:endParaRPr lang="en-US" dirty="0">
-              <a:solidFill>
-                <a:schemeClr val="tx1"/>
-              </a:solidFill>
-            </a:endParaRPr>
-          </a:p>
-        </p:txBody>
-      </p:sp>
-      <p:sp>
-        <p:nvSpPr>
-          <p:cNvPr id="8" name="TextBox 7">
-            <a:extLst>
-              <a:ext uri="{FF2B5EF4-FFF2-40B4-BE49-F238E27FC236}">
-                <a16:creationId xmlns:a16="http://schemas.microsoft.com/office/drawing/2014/main" id="{CD7AFC8A-D092-4B48-9D2F-0D682342C93D}"/>
-              </a:ext>
-            </a:extLst>
-          </p:cNvPr>
-          <p:cNvSpPr txBox="1"/>
-          <p:nvPr/>
-        </p:nvSpPr>
-        <p:spPr>
-          <a:xfrm>
-            <a:off x="3018408" y="2743200"/>
-            <a:ext cx="1791644" cy="369332"/>
-          </a:xfrm>
-          <a:prstGeom prst="rect">
-            <a:avLst/>
-          </a:prstGeom>
-          <a:noFill/>
-        </p:spPr>
-        <p:txBody>
-          <a:bodyPr wrap="none" rtlCol="0">
-            <a:spAutoFit/>
-          </a:bodyPr>
+          <p:cNvPr id="2" name="Title 1">
+            <a:extLst>
+              <a:ext uri="{FF2B5EF4-FFF2-40B4-BE49-F238E27FC236}">
+                <a16:creationId xmlns:a16="http://schemas.microsoft.com/office/drawing/2014/main" id="{40BF7EA0-35A7-F545-89C7-C024A6A36DBC}"/>
+              </a:ext>
+            </a:extLst>
+          </p:cNvPr>
+          <p:cNvSpPr>
+            <a:spLocks noGrp="1"/>
+          </p:cNvSpPr>
+          <p:nvPr>
+            <p:ph type="title"/>
+          </p:nvPr>
+        </p:nvSpPr>
+        <p:spPr>
+          <a:xfrm>
+            <a:off x="0" y="-226842"/>
+            <a:ext cx="10515600" cy="1325563"/>
+          </a:xfrm>
+        </p:spPr>
+        <p:txBody>
+          <a:bodyPr/>
           <a:lstStyle/>
           <a:p>
             <a:r>
               <a:rPr lang="en-US" dirty="0"/>
-              <a:t>Mumbai - Region</a:t>
-            </a:r>
-          </a:p>
-        </p:txBody>
-      </p:sp>
-      <p:sp>
-        <p:nvSpPr>
-          <p:cNvPr id="9" name="TextBox 8">
-            <a:extLst>
-              <a:ext uri="{FF2B5EF4-FFF2-40B4-BE49-F238E27FC236}">
-                <a16:creationId xmlns:a16="http://schemas.microsoft.com/office/drawing/2014/main" id="{1D4B2041-2422-F740-9FB9-E55E196ED95D}"/>
-              </a:ext>
-            </a:extLst>
-          </p:cNvPr>
-          <p:cNvSpPr txBox="1"/>
-          <p:nvPr/>
-        </p:nvSpPr>
-        <p:spPr>
-          <a:xfrm>
-            <a:off x="8351591" y="2195659"/>
-            <a:ext cx="1207959" cy="369332"/>
-          </a:xfrm>
-          <a:prstGeom prst="rect">
-            <a:avLst/>
-          </a:prstGeom>
-          <a:noFill/>
-        </p:spPr>
-        <p:txBody>
-          <a:bodyPr wrap="none" rtlCol="0">
-            <a:spAutoFit/>
-          </a:bodyPr>
-          <a:lstStyle/>
-          <a:p>
-            <a:r>
-              <a:rPr lang="en-US" dirty="0"/>
-              <a:t>Hyderabad</a:t>
-            </a:r>
-          </a:p>
-        </p:txBody>
-      </p:sp>
-      <p:sp>
-        <p:nvSpPr>
-          <p:cNvPr id="10" name="TextBox 9">
-            <a:extLst>
-              <a:ext uri="{FF2B5EF4-FFF2-40B4-BE49-F238E27FC236}">
-                <a16:creationId xmlns:a16="http://schemas.microsoft.com/office/drawing/2014/main" id="{51E02B9A-6A8C-BD43-B9A7-4BD5D08EB1B2}"/>
-              </a:ext>
-            </a:extLst>
-          </p:cNvPr>
-          <p:cNvSpPr txBox="1"/>
-          <p:nvPr/>
-        </p:nvSpPr>
-        <p:spPr>
-          <a:xfrm>
-            <a:off x="2299318" y="3315809"/>
-            <a:ext cx="2760954" cy="1200329"/>
-          </a:xfrm>
-          <a:prstGeom prst="rect">
-            <a:avLst/>
-          </a:prstGeom>
-          <a:noFill/>
-        </p:spPr>
-        <p:txBody>
-          <a:bodyPr wrap="square" rtlCol="0">
-            <a:spAutoFit/>
-          </a:bodyPr>
-          <a:lstStyle/>
-          <a:p>
-            <a:r>
-              <a:rPr lang="en-US" dirty="0"/>
-              <a:t>Andheri AZ-1</a:t>
-            </a:r>
-          </a:p>
-          <a:p>
-            <a:endParaRPr lang="en-US" dirty="0"/>
-          </a:p>
-          <a:p>
-            <a:endParaRPr lang="en-US" dirty="0"/>
-          </a:p>
-          <a:p>
-            <a:r>
-              <a:rPr lang="en-US" dirty="0" err="1"/>
-              <a:t>Malad</a:t>
-            </a:r>
-            <a:r>
-              <a:rPr lang="en-US" dirty="0"/>
-              <a:t> AZ-2</a:t>
-            </a:r>
-          </a:p>
-        </p:txBody>
-      </p:sp>
-      <p:sp>
-        <p:nvSpPr>
-          <p:cNvPr id="11" name="TextBox 10">
-            <a:extLst>
-              <a:ext uri="{FF2B5EF4-FFF2-40B4-BE49-F238E27FC236}">
-                <a16:creationId xmlns:a16="http://schemas.microsoft.com/office/drawing/2014/main" id="{E74F692B-FAE2-1044-8583-B2FBB2A68010}"/>
-              </a:ext>
-            </a:extLst>
-          </p:cNvPr>
-          <p:cNvSpPr txBox="1"/>
-          <p:nvPr/>
-        </p:nvSpPr>
-        <p:spPr>
-          <a:xfrm>
-            <a:off x="7836823" y="2909402"/>
-            <a:ext cx="2636135" cy="1477328"/>
-          </a:xfrm>
-          <a:prstGeom prst="rect">
-            <a:avLst/>
-          </a:prstGeom>
-          <a:noFill/>
-        </p:spPr>
-        <p:txBody>
-          <a:bodyPr wrap="square" rtlCol="0">
-            <a:spAutoFit/>
-          </a:bodyPr>
-          <a:lstStyle/>
-          <a:p>
-            <a:r>
-              <a:rPr lang="en-US" dirty="0" err="1"/>
-              <a:t>MerkhanPet</a:t>
-            </a:r>
-            <a:r>
-              <a:rPr lang="en-US" dirty="0"/>
-              <a:t> – Flipkart</a:t>
-            </a:r>
-          </a:p>
-          <a:p>
-            <a:r>
-              <a:rPr lang="en-US" dirty="0"/>
-              <a:t>AZ-1</a:t>
-            </a:r>
-          </a:p>
-          <a:p>
-            <a:endParaRPr lang="en-US" dirty="0"/>
-          </a:p>
-          <a:p>
-            <a:r>
-              <a:rPr lang="en-US" dirty="0" err="1"/>
-              <a:t>Chandravelli</a:t>
-            </a:r>
-            <a:r>
-              <a:rPr lang="en-US" dirty="0"/>
-              <a:t> – Flipkart</a:t>
-            </a:r>
-          </a:p>
-          <a:p>
-            <a:r>
-              <a:rPr lang="en-US" dirty="0"/>
-              <a:t>AZ-2</a:t>
-            </a:r>
-          </a:p>
-        </p:txBody>
-      </p:sp>
-      <p:sp>
-        <p:nvSpPr>
-          <p:cNvPr id="13" name="TextBox 12">
-            <a:extLst>
-              <a:ext uri="{FF2B5EF4-FFF2-40B4-BE49-F238E27FC236}">
-                <a16:creationId xmlns:a16="http://schemas.microsoft.com/office/drawing/2014/main" id="{BC232BF2-5980-FD4E-BA94-FF1E997898EB}"/>
-              </a:ext>
-            </a:extLst>
-          </p:cNvPr>
-          <p:cNvSpPr txBox="1"/>
-          <p:nvPr/>
-        </p:nvSpPr>
-        <p:spPr>
-          <a:xfrm>
-            <a:off x="9559550" y="2183199"/>
-            <a:ext cx="826637" cy="369332"/>
-          </a:xfrm>
-          <a:prstGeom prst="rect">
-            <a:avLst/>
-          </a:prstGeom>
-          <a:noFill/>
-        </p:spPr>
-        <p:txBody>
-          <a:bodyPr wrap="none" rtlCol="0">
-            <a:spAutoFit/>
-          </a:bodyPr>
-          <a:lstStyle/>
-          <a:p>
-            <a:r>
-              <a:rPr lang="en-US" dirty="0"/>
-              <a:t>Region</a:t>
-            </a:r>
-          </a:p>
-        </p:txBody>
-      </p:sp>
-      <p:cxnSp>
-        <p:nvCxnSpPr>
-          <p:cNvPr id="15" name="Straight Arrow Connector 14">
-            <a:extLst>
-              <a:ext uri="{FF2B5EF4-FFF2-40B4-BE49-F238E27FC236}">
-                <a16:creationId xmlns:a16="http://schemas.microsoft.com/office/drawing/2014/main" id="{D7C6E5B1-C85D-0A4C-8339-46C35EAAB9C0}"/>
-              </a:ext>
-            </a:extLst>
-          </p:cNvPr>
-          <p:cNvCxnSpPr>
-            <a:stCxn id="6" idx="1"/>
-          </p:cNvCxnSpPr>
-          <p:nvPr/>
-        </p:nvCxnSpPr>
-        <p:spPr>
-          <a:xfrm flipH="1">
-            <a:off x="5734975" y="3315810"/>
-            <a:ext cx="1233996" cy="113190"/>
-          </a:xfrm>
-          <a:prstGeom prst="straightConnector1">
-            <a:avLst/>
-          </a:prstGeom>
-          <a:ln>
-            <a:tailEnd type="triangle"/>
-          </a:ln>
-        </p:spPr>
-        <p:style>
-          <a:lnRef idx="1">
-            <a:schemeClr val="accent1"/>
-          </a:lnRef>
-          <a:fillRef idx="0">
-            <a:schemeClr val="accent1"/>
-          </a:fillRef>
-          <a:effectRef idx="0">
-            <a:schemeClr val="accent1"/>
-          </a:effectRef>
-          <a:fontRef idx="minor">
-            <a:schemeClr val="tx1"/>
-          </a:fontRef>
-        </p:style>
-      </p:cxnSp>
-      <p:cxnSp>
-        <p:nvCxnSpPr>
-          <p:cNvPr id="17" name="Straight Arrow Connector 16">
-            <a:extLst>
-              <a:ext uri="{FF2B5EF4-FFF2-40B4-BE49-F238E27FC236}">
-                <a16:creationId xmlns:a16="http://schemas.microsoft.com/office/drawing/2014/main" id="{2966B6E8-FA45-E946-A272-1E6B5C4EECAF}"/>
-              </a:ext>
-            </a:extLst>
-          </p:cNvPr>
-          <p:cNvCxnSpPr/>
-          <p:nvPr/>
-        </p:nvCxnSpPr>
-        <p:spPr>
-          <a:xfrm flipV="1">
-            <a:off x="5734975" y="2743200"/>
-            <a:ext cx="1233996" cy="166202"/>
-          </a:xfrm>
-          <a:prstGeom prst="straightConnector1">
-            <a:avLst/>
-          </a:prstGeom>
-          <a:ln>
-            <a:tailEnd type="triangle"/>
-          </a:ln>
-        </p:spPr>
-        <p:style>
-          <a:lnRef idx="1">
-            <a:schemeClr val="accent1"/>
-          </a:lnRef>
-          <a:fillRef idx="0">
-            <a:schemeClr val="accent1"/>
-          </a:fillRef>
-          <a:effectRef idx="0">
-            <a:schemeClr val="accent1"/>
-          </a:effectRef>
-          <a:fontRef idx="minor">
-            <a:schemeClr val="tx1"/>
-          </a:fontRef>
-        </p:style>
-      </p:cxnSp>
-      <p:sp>
-        <p:nvSpPr>
-          <p:cNvPr id="18" name="TextBox 17">
-            <a:extLst>
-              <a:ext uri="{FF2B5EF4-FFF2-40B4-BE49-F238E27FC236}">
-                <a16:creationId xmlns:a16="http://schemas.microsoft.com/office/drawing/2014/main" id="{04B79F4F-05BA-6543-9D1D-A33312659978}"/>
-              </a:ext>
-            </a:extLst>
-          </p:cNvPr>
-          <p:cNvSpPr txBox="1"/>
-          <p:nvPr/>
-        </p:nvSpPr>
-        <p:spPr>
-          <a:xfrm>
-            <a:off x="5779552" y="1918660"/>
-            <a:ext cx="1040606" cy="646331"/>
-          </a:xfrm>
-          <a:prstGeom prst="rect">
-            <a:avLst/>
-          </a:prstGeom>
-          <a:noFill/>
-        </p:spPr>
-        <p:txBody>
-          <a:bodyPr wrap="none" rtlCol="0">
-            <a:spAutoFit/>
-          </a:bodyPr>
-          <a:lstStyle/>
-          <a:p>
-            <a:r>
-              <a:rPr lang="en-US" dirty="0"/>
-              <a:t>Disaster</a:t>
-            </a:r>
-          </a:p>
-          <a:p>
-            <a:r>
-              <a:rPr lang="en-US" dirty="0"/>
-              <a:t>Recovery</a:t>
-            </a:r>
-          </a:p>
-        </p:txBody>
-      </p:sp>
-      <p:sp>
-        <p:nvSpPr>
-          <p:cNvPr id="19" name="Rectangle 18">
-            <a:extLst>
-              <a:ext uri="{FF2B5EF4-FFF2-40B4-BE49-F238E27FC236}">
-                <a16:creationId xmlns:a16="http://schemas.microsoft.com/office/drawing/2014/main" id="{9B87830E-303D-9048-B1FA-BA53E82705C3}"/>
-              </a:ext>
-            </a:extLst>
-          </p:cNvPr>
-          <p:cNvSpPr/>
-          <p:nvPr/>
-        </p:nvSpPr>
-        <p:spPr>
-          <a:xfrm>
-            <a:off x="4685269" y="6526853"/>
-            <a:ext cx="1851212" cy="307777"/>
-          </a:xfrm>
-          <a:prstGeom prst="rect">
-            <a:avLst/>
-          </a:prstGeom>
-        </p:spPr>
-        <p:txBody>
-          <a:bodyPr wrap="none">
-            <a:spAutoFit/>
-          </a:bodyPr>
-          <a:lstStyle/>
-          <a:p>
-            <a:r>
-              <a:rPr lang="en-US" sz="1400" b="1" dirty="0"/>
-              <a:t>Running Notes in class</a:t>
-            </a:r>
-          </a:p>
-        </p:txBody>
-      </p:sp>
+              <a:t>Internet Gateway</a:t>
+            </a:r>
+          </a:p>
+        </p:txBody>
+      </p:sp>
+      <p:pic>
+        <p:nvPicPr>
+          <p:cNvPr id="5" name="Content Placeholder 4" descr="Diagram&#10;&#10;Description automatically generated">
+            <a:extLst>
+              <a:ext uri="{FF2B5EF4-FFF2-40B4-BE49-F238E27FC236}">
+                <a16:creationId xmlns:a16="http://schemas.microsoft.com/office/drawing/2014/main" id="{6F3EF72B-4A22-1D41-9640-7E57A8A9B7B8}"/>
+              </a:ext>
+            </a:extLst>
+          </p:cNvPr>
+          <p:cNvPicPr>
+            <a:picLocks noGrp="1" noChangeAspect="1"/>
+          </p:cNvPicPr>
+          <p:nvPr>
+            <p:ph idx="1"/>
+          </p:nvPr>
+        </p:nvPicPr>
+        <p:blipFill>
+          <a:blip r:embed="rId2"/>
+          <a:stretch>
+            <a:fillRect/>
+          </a:stretch>
+        </p:blipFill>
+        <p:spPr>
+          <a:xfrm>
+            <a:off x="2630078" y="631596"/>
+            <a:ext cx="9311058" cy="5545367"/>
+          </a:xfrm>
+        </p:spPr>
+      </p:pic>
     </p:spTree>
     <p:extLst>
       <p:ext uri="{BB962C8B-B14F-4D97-AF65-F5344CB8AC3E}">
-        <p14:creationId xmlns:p14="http://schemas.microsoft.com/office/powerpoint/2010/main" val="2210824700"/>
+        <p14:creationId xmlns:p14="http://schemas.microsoft.com/office/powerpoint/2010/main" val="3861280568"/>
       </p:ext>
     </p:extLst>
   </p:cSld>
@@ -5346,200 +6965,59 @@
           <a:chExt cx="0" cy="0"/>
         </a:xfrm>
       </p:grpSpPr>
-      <p:sp>
-        <p:nvSpPr>
-          <p:cNvPr id="3" name="Content Placeholder 2">
-            <a:extLst>
-              <a:ext uri="{FF2B5EF4-FFF2-40B4-BE49-F238E27FC236}">
-                <a16:creationId xmlns:a16="http://schemas.microsoft.com/office/drawing/2014/main" id="{D33CC403-B472-D748-BFB5-F4C96696F3B2}"/>
-              </a:ext>
-            </a:extLst>
-          </p:cNvPr>
-          <p:cNvSpPr>
-            <a:spLocks noGrp="1"/>
-          </p:cNvSpPr>
-          <p:nvPr>
-            <p:ph idx="1"/>
-          </p:nvPr>
-        </p:nvSpPr>
-        <p:spPr>
-          <a:xfrm>
-            <a:off x="490555" y="325298"/>
-            <a:ext cx="10515600" cy="926452"/>
-          </a:xfrm>
-        </p:spPr>
-        <p:txBody>
-          <a:bodyPr>
-            <a:normAutofit/>
-          </a:bodyPr>
-          <a:lstStyle/>
-          <a:p>
-            <a:r>
-              <a:rPr lang="en-US" sz="1000" dirty="0"/>
-              <a:t> Region</a:t>
-            </a:r>
-          </a:p>
-          <a:p>
-            <a:pPr lvl="1"/>
-            <a:r>
-              <a:rPr lang="en-US" sz="1000" dirty="0"/>
-              <a:t>AZ  </a:t>
-            </a:r>
-          </a:p>
-          <a:p>
-            <a:pPr lvl="2"/>
-            <a:r>
-              <a:rPr lang="en-US" sz="1000" dirty="0"/>
-              <a:t>Subnet </a:t>
-            </a:r>
-          </a:p>
-        </p:txBody>
-      </p:sp>
-      <p:sp>
-        <p:nvSpPr>
-          <p:cNvPr id="4" name="Frame 3">
-            <a:extLst>
-              <a:ext uri="{FF2B5EF4-FFF2-40B4-BE49-F238E27FC236}">
-                <a16:creationId xmlns:a16="http://schemas.microsoft.com/office/drawing/2014/main" id="{76188D35-A1C4-0649-AA92-5FDBD67BD277}"/>
-              </a:ext>
-            </a:extLst>
-          </p:cNvPr>
-          <p:cNvSpPr/>
+      <p:pic>
+        <p:nvPicPr>
+          <p:cNvPr id="1026" name="Picture 2" descr="NAT Gateway Traffic">
+            <a:extLst>
+              <a:ext uri="{FF2B5EF4-FFF2-40B4-BE49-F238E27FC236}">
+                <a16:creationId xmlns:a16="http://schemas.microsoft.com/office/drawing/2014/main" id="{7FAF1835-7C52-1343-8BE9-92CC4BFBCFA7}"/>
+              </a:ext>
+            </a:extLst>
+          </p:cNvPr>
+          <p:cNvPicPr>
+            <a:picLocks noChangeAspect="1" noChangeArrowheads="1"/>
+          </p:cNvPicPr>
           <p:nvPr/>
-        </p:nvSpPr>
-        <p:spPr>
-          <a:xfrm>
-            <a:off x="736846" y="2130641"/>
-            <a:ext cx="5122415" cy="3817398"/>
-          </a:xfrm>
-          <a:prstGeom prst="frame">
-            <a:avLst/>
-          </a:prstGeom>
-        </p:spPr>
-        <p:style>
-          <a:lnRef idx="2">
-            <a:schemeClr val="accent1">
-              <a:shade val="50000"/>
-            </a:schemeClr>
-          </a:lnRef>
-          <a:fillRef idx="1">
-            <a:schemeClr val="accent1"/>
-          </a:fillRef>
-          <a:effectRef idx="0">
-            <a:schemeClr val="accent1"/>
-          </a:effectRef>
-          <a:fontRef idx="minor">
-            <a:schemeClr val="lt1"/>
-          </a:fontRef>
-        </p:style>
-        <p:txBody>
-          <a:bodyPr rtlCol="0" anchor="ctr"/>
-          <a:lstStyle/>
-          <a:p>
-            <a:pPr algn="ctr"/>
-            <a:endParaRPr lang="en-US" dirty="0">
-              <a:solidFill>
-                <a:schemeClr val="tx1"/>
-              </a:solidFill>
-            </a:endParaRPr>
-          </a:p>
-        </p:txBody>
-      </p:sp>
-      <p:sp>
-        <p:nvSpPr>
-          <p:cNvPr id="9" name="TextBox 8">
-            <a:extLst>
-              <a:ext uri="{FF2B5EF4-FFF2-40B4-BE49-F238E27FC236}">
-                <a16:creationId xmlns:a16="http://schemas.microsoft.com/office/drawing/2014/main" id="{B763A9A5-2AF3-734B-AF1B-A1C52B781506}"/>
-              </a:ext>
-            </a:extLst>
-          </p:cNvPr>
-          <p:cNvSpPr txBox="1"/>
-          <p:nvPr/>
-        </p:nvSpPr>
-        <p:spPr>
-          <a:xfrm>
-            <a:off x="2695407" y="301339"/>
-            <a:ext cx="6726602" cy="707886"/>
+        </p:nvPicPr>
+        <p:blipFill>
+          <a:blip r:embed="rId2">
+            <a:extLst>
+              <a:ext uri="{28A0092B-C50C-407E-A947-70E740481C1C}">
+                <a14:useLocalDpi xmlns:a14="http://schemas.microsoft.com/office/drawing/2010/main" val="0"/>
+              </a:ext>
+            </a:extLst>
+          </a:blip>
+          <a:srcRect/>
+          <a:stretch>
+            <a:fillRect/>
+          </a:stretch>
+        </p:blipFill>
+        <p:spPr bwMode="auto">
+          <a:xfrm>
+            <a:off x="2224726" y="511148"/>
+            <a:ext cx="7188691" cy="6346852"/>
           </a:xfrm>
           <a:prstGeom prst="rect">
             <a:avLst/>
           </a:prstGeom>
           <a:noFill/>
-        </p:spPr>
-        <p:txBody>
-          <a:bodyPr wrap="square" rtlCol="0">
-            <a:spAutoFit/>
-          </a:bodyPr>
-          <a:lstStyle/>
-          <a:p>
-            <a:r>
-              <a:rPr lang="en-US" sz="1000" dirty="0"/>
-              <a:t>Virtual Networking – Cloud – Private</a:t>
-            </a:r>
-          </a:p>
-          <a:p>
-            <a:r>
-              <a:rPr lang="en-US" sz="1000" dirty="0"/>
-              <a:t>      Subnet -  Piece/Part of Whole Network</a:t>
-            </a:r>
-          </a:p>
-          <a:p>
-            <a:r>
-              <a:rPr lang="en-US" sz="1000" dirty="0"/>
-              <a:t>Public Subnet: Web Server</a:t>
-            </a:r>
-          </a:p>
-          <a:p>
-            <a:r>
-              <a:rPr lang="en-US" sz="1000" dirty="0"/>
-              <a:t>Private Subnet: Application, Data Base</a:t>
-            </a:r>
-          </a:p>
-        </p:txBody>
-      </p:sp>
-      <p:cxnSp>
-        <p:nvCxnSpPr>
-          <p:cNvPr id="12" name="Straight Connector 11">
-            <a:extLst>
-              <a:ext uri="{FF2B5EF4-FFF2-40B4-BE49-F238E27FC236}">
-                <a16:creationId xmlns:a16="http://schemas.microsoft.com/office/drawing/2014/main" id="{9034959F-F5AA-444F-B126-D7FC5E874F89}"/>
-              </a:ext>
-            </a:extLst>
-          </p:cNvPr>
-          <p:cNvCxnSpPr/>
-          <p:nvPr/>
-        </p:nvCxnSpPr>
-        <p:spPr>
-          <a:xfrm>
-            <a:off x="1229556" y="3852909"/>
-            <a:ext cx="4136994" cy="0"/>
-          </a:xfrm>
-          <a:prstGeom prst="line">
-            <a:avLst/>
-          </a:prstGeom>
-        </p:spPr>
-        <p:style>
-          <a:lnRef idx="1">
-            <a:schemeClr val="accent1"/>
-          </a:lnRef>
-          <a:fillRef idx="0">
-            <a:schemeClr val="accent1"/>
-          </a:fillRef>
-          <a:effectRef idx="0">
-            <a:schemeClr val="accent1"/>
-          </a:effectRef>
-          <a:fontRef idx="minor">
-            <a:schemeClr val="tx1"/>
-          </a:fontRef>
-        </p:style>
-      </p:cxnSp>
-      <p:sp>
-        <p:nvSpPr>
-          <p:cNvPr id="15" name="TextBox 14">
-            <a:extLst>
-              <a:ext uri="{FF2B5EF4-FFF2-40B4-BE49-F238E27FC236}">
-                <a16:creationId xmlns:a16="http://schemas.microsoft.com/office/drawing/2014/main" id="{7BC677A1-D69D-2A46-BC8A-B6449A056051}"/>
+          <a:extLst>
+            <a:ext uri="{909E8E84-426E-40DD-AFC4-6F175D3DCCD1}">
+              <a14:hiddenFill xmlns:a14="http://schemas.microsoft.com/office/drawing/2010/main">
+                <a:solidFill>
+                  <a:srgbClr val="FFFFFF"/>
+                </a:solidFill>
+              </a14:hiddenFill>
+            </a:ext>
+          </a:extLst>
+        </p:spPr>
+      </p:pic>
+      <p:sp>
+        <p:nvSpPr>
+          <p:cNvPr id="4" name="TextBox 3">
+            <a:extLst>
+              <a:ext uri="{FF2B5EF4-FFF2-40B4-BE49-F238E27FC236}">
+                <a16:creationId xmlns:a16="http://schemas.microsoft.com/office/drawing/2014/main" id="{5E84964A-676E-F44D-B60D-93C17F155824}"/>
               </a:ext>
             </a:extLst>
           </p:cNvPr>
@@ -5548,8 +7026,8 @@
         </p:nvSpPr>
         <p:spPr>
           <a:xfrm>
-            <a:off x="1229556" y="2622443"/>
-            <a:ext cx="1465851" cy="369332"/>
+            <a:off x="276245" y="126427"/>
+            <a:ext cx="3106491" cy="769441"/>
           </a:xfrm>
           <a:prstGeom prst="rect">
             <a:avLst/>
@@ -5563,1056 +7041,189 @@
           <a:lstStyle/>
           <a:p>
             <a:r>
+              <a:rPr lang="en-US" sz="4400" dirty="0">
+                <a:latin typeface="+mj-lt"/>
+                <a:ea typeface="+mj-ea"/>
+                <a:cs typeface="+mj-cs"/>
+              </a:rPr>
+              <a:t>NAT</a:t>
+            </a:r>
+            <a:r>
               <a:rPr lang="en-US" dirty="0"/>
-              <a:t>Public Subnet</a:t>
-            </a:r>
-          </a:p>
-        </p:txBody>
-      </p:sp>
-      <p:sp>
-        <p:nvSpPr>
-          <p:cNvPr id="16" name="TextBox 15">
-            <a:extLst>
-              <a:ext uri="{FF2B5EF4-FFF2-40B4-BE49-F238E27FC236}">
-                <a16:creationId xmlns:a16="http://schemas.microsoft.com/office/drawing/2014/main" id="{37928AC1-1919-AD47-B2E7-AC8A9C2EC4F1}"/>
-              </a:ext>
-            </a:extLst>
-          </p:cNvPr>
-          <p:cNvSpPr txBox="1"/>
+              <a:t> </a:t>
+            </a:r>
+            <a:r>
+              <a:rPr lang="en-US" sz="4400" dirty="0">
+                <a:latin typeface="+mj-lt"/>
+                <a:ea typeface="+mj-ea"/>
+                <a:cs typeface="+mj-cs"/>
+              </a:rPr>
+              <a:t>Gateway</a:t>
+            </a:r>
+          </a:p>
+        </p:txBody>
+      </p:sp>
+    </p:spTree>
+    <p:extLst>
+      <p:ext uri="{BB962C8B-B14F-4D97-AF65-F5344CB8AC3E}">
+        <p14:creationId xmlns:p14="http://schemas.microsoft.com/office/powerpoint/2010/main" val="4163607399"/>
+      </p:ext>
+    </p:extLst>
+  </p:cSld>
+  <p:clrMapOvr>
+    <a:masterClrMapping/>
+  </p:clrMapOvr>
+</p:sld>
+</file>
+
+<file path=ppt/slides/slide9.xml><?xml version="1.0" encoding="utf-8"?>
+<p:sld xmlns:a="http://schemas.openxmlformats.org/drawingml/2006/main" xmlns:r="http://schemas.openxmlformats.org/officeDocument/2006/relationships" xmlns:p="http://schemas.openxmlformats.org/presentationml/2006/main">
+  <p:cSld>
+    <p:spTree>
+      <p:nvGrpSpPr>
+        <p:cNvPr id="1" name=""/>
+        <p:cNvGrpSpPr/>
+        <p:nvPr/>
+      </p:nvGrpSpPr>
+      <p:grpSpPr>
+        <a:xfrm>
+          <a:off x="0" y="0"/>
+          <a:ext cx="0" cy="0"/>
+          <a:chOff x="0" y="0"/>
+          <a:chExt cx="0" cy="0"/>
+        </a:xfrm>
+      </p:grpSpPr>
+      <p:sp>
+        <p:nvSpPr>
+          <p:cNvPr id="4" name="Rectangle 3">
+            <a:extLst>
+              <a:ext uri="{FF2B5EF4-FFF2-40B4-BE49-F238E27FC236}">
+                <a16:creationId xmlns:a16="http://schemas.microsoft.com/office/drawing/2014/main" id="{F8496930-ADF3-EC43-9ED2-2901EDCDF2DF}"/>
+              </a:ext>
+            </a:extLst>
+          </p:cNvPr>
+          <p:cNvSpPr/>
           <p:nvPr/>
         </p:nvSpPr>
         <p:spPr>
           <a:xfrm>
-            <a:off x="1305017" y="4039340"/>
-            <a:ext cx="1603709" cy="369332"/>
+            <a:off x="735291" y="889844"/>
+            <a:ext cx="10001839" cy="3416320"/>
           </a:xfrm>
           <a:prstGeom prst="rect">
             <a:avLst/>
           </a:prstGeom>
-          <a:noFill/>
-        </p:spPr>
-        <p:txBody>
-          <a:bodyPr wrap="none" rtlCol="0">
+        </p:spPr>
+        <p:txBody>
+          <a:bodyPr wrap="square">
             <a:spAutoFit/>
           </a:bodyPr>
           <a:lstStyle/>
           <a:p>
             <a:r>
-              <a:rPr lang="en-US" dirty="0"/>
-              <a:t>Private  Subnet</a:t>
-            </a:r>
-          </a:p>
-        </p:txBody>
-      </p:sp>
-      <p:cxnSp>
-        <p:nvCxnSpPr>
-          <p:cNvPr id="18" name="Straight Arrow Connector 17">
-            <a:extLst>
-              <a:ext uri="{FF2B5EF4-FFF2-40B4-BE49-F238E27FC236}">
-                <a16:creationId xmlns:a16="http://schemas.microsoft.com/office/drawing/2014/main" id="{8324E710-74FF-474A-B5CB-277AC3FB1693}"/>
-              </a:ext>
-            </a:extLst>
-          </p:cNvPr>
-          <p:cNvCxnSpPr>
-            <a:cxnSpLocks/>
-          </p:cNvCxnSpPr>
-          <p:nvPr/>
-        </p:nvCxnSpPr>
-        <p:spPr>
-          <a:xfrm>
-            <a:off x="3633830" y="1701839"/>
-            <a:ext cx="0" cy="1316569"/>
-          </a:xfrm>
-          <a:prstGeom prst="straightConnector1">
-            <a:avLst/>
-          </a:prstGeom>
-          <a:ln>
-            <a:tailEnd type="triangle"/>
-          </a:ln>
-        </p:spPr>
-        <p:style>
-          <a:lnRef idx="1">
-            <a:schemeClr val="accent1"/>
-          </a:lnRef>
-          <a:fillRef idx="0">
-            <a:schemeClr val="accent1"/>
-          </a:fillRef>
-          <a:effectRef idx="0">
-            <a:schemeClr val="accent1"/>
-          </a:effectRef>
-          <a:fontRef idx="minor">
-            <a:schemeClr val="tx1"/>
-          </a:fontRef>
-        </p:style>
-      </p:cxnSp>
-      <p:sp>
-        <p:nvSpPr>
-          <p:cNvPr id="19" name="Oval 18">
-            <a:extLst>
-              <a:ext uri="{FF2B5EF4-FFF2-40B4-BE49-F238E27FC236}">
-                <a16:creationId xmlns:a16="http://schemas.microsoft.com/office/drawing/2014/main" id="{E0D05AA3-2869-EE4B-A8AA-FC44BF2C1744}"/>
-              </a:ext>
-            </a:extLst>
-          </p:cNvPr>
-          <p:cNvSpPr/>
-          <p:nvPr/>
-        </p:nvSpPr>
-        <p:spPr>
-          <a:xfrm>
-            <a:off x="3188117" y="2991775"/>
-            <a:ext cx="1188574" cy="683581"/>
-          </a:xfrm>
-          <a:prstGeom prst="ellipse">
-            <a:avLst/>
-          </a:prstGeom>
-        </p:spPr>
-        <p:style>
-          <a:lnRef idx="2">
-            <a:schemeClr val="accent6"/>
-          </a:lnRef>
-          <a:fillRef idx="1">
-            <a:schemeClr val="lt1"/>
-          </a:fillRef>
-          <a:effectRef idx="0">
-            <a:schemeClr val="accent6"/>
-          </a:effectRef>
-          <a:fontRef idx="minor">
-            <a:schemeClr val="dk1"/>
-          </a:fontRef>
-        </p:style>
-        <p:txBody>
-          <a:bodyPr rtlCol="0" anchor="ctr"/>
-          <a:lstStyle/>
-          <a:p>
-            <a:pPr algn="ctr"/>
-            <a:r>
-              <a:rPr lang="en-US" dirty="0"/>
-              <a:t>Web Server</a:t>
-            </a:r>
-          </a:p>
-        </p:txBody>
-      </p:sp>
-      <p:sp>
-        <p:nvSpPr>
-          <p:cNvPr id="22" name="Oval 21">
-            <a:extLst>
-              <a:ext uri="{FF2B5EF4-FFF2-40B4-BE49-F238E27FC236}">
-                <a16:creationId xmlns:a16="http://schemas.microsoft.com/office/drawing/2014/main" id="{A0080861-F41B-0D4B-8B50-08672094F12A}"/>
-              </a:ext>
-            </a:extLst>
-          </p:cNvPr>
-          <p:cNvSpPr/>
-          <p:nvPr/>
-        </p:nvSpPr>
-        <p:spPr>
-          <a:xfrm>
-            <a:off x="3062796" y="4030462"/>
-            <a:ext cx="1807895" cy="692458"/>
-          </a:xfrm>
-          <a:prstGeom prst="ellipse">
-            <a:avLst/>
-          </a:prstGeom>
-        </p:spPr>
-        <p:style>
-          <a:lnRef idx="2">
-            <a:schemeClr val="accent6"/>
-          </a:lnRef>
-          <a:fillRef idx="1">
-            <a:schemeClr val="lt1"/>
-          </a:fillRef>
-          <a:effectRef idx="0">
-            <a:schemeClr val="accent6"/>
-          </a:effectRef>
-          <a:fontRef idx="minor">
-            <a:schemeClr val="dk1"/>
-          </a:fontRef>
-        </p:style>
-        <p:txBody>
-          <a:bodyPr rtlCol="0" anchor="ctr"/>
-          <a:lstStyle/>
-          <a:p>
-            <a:pPr algn="ctr"/>
-            <a:r>
-              <a:rPr lang="en-US" dirty="0"/>
-              <a:t>Application</a:t>
-            </a:r>
-          </a:p>
-        </p:txBody>
-      </p:sp>
-      <p:sp>
-        <p:nvSpPr>
-          <p:cNvPr id="23" name="Can 22">
-            <a:extLst>
-              <a:ext uri="{FF2B5EF4-FFF2-40B4-BE49-F238E27FC236}">
-                <a16:creationId xmlns:a16="http://schemas.microsoft.com/office/drawing/2014/main" id="{33084D53-729F-2342-8924-02D620325E77}"/>
-              </a:ext>
-            </a:extLst>
-          </p:cNvPr>
-          <p:cNvSpPr/>
-          <p:nvPr/>
-        </p:nvSpPr>
-        <p:spPr>
-          <a:xfrm>
-            <a:off x="3782404" y="5051395"/>
-            <a:ext cx="452761" cy="346229"/>
-          </a:xfrm>
-          <a:prstGeom prst="can">
-            <a:avLst/>
-          </a:prstGeom>
-        </p:spPr>
-        <p:style>
-          <a:lnRef idx="2">
-            <a:schemeClr val="accent1">
-              <a:shade val="50000"/>
-            </a:schemeClr>
-          </a:lnRef>
-          <a:fillRef idx="1">
-            <a:schemeClr val="accent1"/>
-          </a:fillRef>
-          <a:effectRef idx="0">
-            <a:schemeClr val="accent1"/>
-          </a:effectRef>
-          <a:fontRef idx="minor">
-            <a:schemeClr val="lt1"/>
-          </a:fontRef>
-        </p:style>
-        <p:txBody>
-          <a:bodyPr rtlCol="0" anchor="ctr"/>
-          <a:lstStyle/>
-          <a:p>
-            <a:pPr algn="ctr"/>
-            <a:r>
-              <a:rPr lang="en-US" dirty="0"/>
-              <a:t>DB</a:t>
-            </a:r>
-          </a:p>
-        </p:txBody>
-      </p:sp>
-      <p:cxnSp>
-        <p:nvCxnSpPr>
-          <p:cNvPr id="25" name="Straight Arrow Connector 24">
-            <a:extLst>
-              <a:ext uri="{FF2B5EF4-FFF2-40B4-BE49-F238E27FC236}">
-                <a16:creationId xmlns:a16="http://schemas.microsoft.com/office/drawing/2014/main" id="{60C3CAA7-1448-BE40-8579-E832E7F0A52F}"/>
-              </a:ext>
-            </a:extLst>
-          </p:cNvPr>
-          <p:cNvCxnSpPr>
-            <a:stCxn id="19" idx="4"/>
-          </p:cNvCxnSpPr>
-          <p:nvPr/>
-        </p:nvCxnSpPr>
-        <p:spPr>
-          <a:xfrm>
-            <a:off x="3782404" y="3675356"/>
-            <a:ext cx="0" cy="363984"/>
-          </a:xfrm>
-          <a:prstGeom prst="straightConnector1">
-            <a:avLst/>
-          </a:prstGeom>
-          <a:ln>
-            <a:tailEnd type="triangle"/>
-          </a:ln>
-        </p:spPr>
-        <p:style>
-          <a:lnRef idx="1">
-            <a:schemeClr val="accent1"/>
-          </a:lnRef>
-          <a:fillRef idx="0">
-            <a:schemeClr val="accent1"/>
-          </a:fillRef>
-          <a:effectRef idx="0">
-            <a:schemeClr val="accent1"/>
-          </a:effectRef>
-          <a:fontRef idx="minor">
-            <a:schemeClr val="tx1"/>
-          </a:fontRef>
-        </p:style>
-      </p:cxnSp>
-      <p:cxnSp>
-        <p:nvCxnSpPr>
-          <p:cNvPr id="27" name="Straight Arrow Connector 26">
-            <a:extLst>
-              <a:ext uri="{FF2B5EF4-FFF2-40B4-BE49-F238E27FC236}">
-                <a16:creationId xmlns:a16="http://schemas.microsoft.com/office/drawing/2014/main" id="{4B628F41-5999-C242-A88B-5F9EA63A30D4}"/>
-              </a:ext>
-            </a:extLst>
-          </p:cNvPr>
-          <p:cNvCxnSpPr>
-            <a:stCxn id="22" idx="4"/>
-            <a:endCxn id="23" idx="1"/>
-          </p:cNvCxnSpPr>
-          <p:nvPr/>
-        </p:nvCxnSpPr>
-        <p:spPr>
-          <a:xfrm>
-            <a:off x="3966744" y="4722920"/>
-            <a:ext cx="42041" cy="328475"/>
-          </a:xfrm>
-          <a:prstGeom prst="straightConnector1">
-            <a:avLst/>
-          </a:prstGeom>
-          <a:ln>
-            <a:tailEnd type="triangle"/>
-          </a:ln>
-        </p:spPr>
-        <p:style>
-          <a:lnRef idx="1">
-            <a:schemeClr val="accent1"/>
-          </a:lnRef>
-          <a:fillRef idx="0">
-            <a:schemeClr val="accent1"/>
-          </a:fillRef>
-          <a:effectRef idx="0">
-            <a:schemeClr val="accent1"/>
-          </a:effectRef>
-          <a:fontRef idx="minor">
-            <a:schemeClr val="tx1"/>
-          </a:fontRef>
-        </p:style>
-      </p:cxnSp>
-      <p:sp>
-        <p:nvSpPr>
-          <p:cNvPr id="28" name="TextBox 27">
-            <a:extLst>
-              <a:ext uri="{FF2B5EF4-FFF2-40B4-BE49-F238E27FC236}">
-                <a16:creationId xmlns:a16="http://schemas.microsoft.com/office/drawing/2014/main" id="{13A61C56-C9DF-B340-89EC-DADD559C57BC}"/>
-              </a:ext>
-            </a:extLst>
-          </p:cNvPr>
-          <p:cNvSpPr txBox="1"/>
-          <p:nvPr/>
-        </p:nvSpPr>
-        <p:spPr>
-          <a:xfrm>
-            <a:off x="4376691" y="3572354"/>
-            <a:ext cx="436338" cy="369332"/>
-          </a:xfrm>
-          <a:prstGeom prst="rect">
-            <a:avLst/>
-          </a:prstGeom>
-          <a:noFill/>
-        </p:spPr>
-        <p:txBody>
-          <a:bodyPr wrap="none" rtlCol="0">
-            <a:spAutoFit/>
-          </a:bodyPr>
-          <a:lstStyle/>
-          <a:p>
-            <a:r>
-              <a:rPr lang="en-US" dirty="0"/>
-              <a:t>SG</a:t>
-            </a:r>
-          </a:p>
-        </p:txBody>
-      </p:sp>
-      <p:sp>
-        <p:nvSpPr>
-          <p:cNvPr id="29" name="Rectangle 28">
-            <a:extLst>
-              <a:ext uri="{FF2B5EF4-FFF2-40B4-BE49-F238E27FC236}">
-                <a16:creationId xmlns:a16="http://schemas.microsoft.com/office/drawing/2014/main" id="{E28D9B73-A157-0E4B-94B1-04ED111B78E2}"/>
-              </a:ext>
-            </a:extLst>
-          </p:cNvPr>
-          <p:cNvSpPr/>
-          <p:nvPr/>
-        </p:nvSpPr>
-        <p:spPr>
-          <a:xfrm>
-            <a:off x="4476395" y="4714044"/>
-            <a:ext cx="436338" cy="369332"/>
-          </a:xfrm>
-          <a:prstGeom prst="rect">
-            <a:avLst/>
-          </a:prstGeom>
-        </p:spPr>
-        <p:txBody>
-          <a:bodyPr wrap="none">
-            <a:spAutoFit/>
-          </a:bodyPr>
-          <a:lstStyle/>
-          <a:p>
-            <a:r>
-              <a:rPr lang="en-US" dirty="0"/>
-              <a:t>SG</a:t>
-            </a:r>
-          </a:p>
-        </p:txBody>
-      </p:sp>
-      <p:sp>
-        <p:nvSpPr>
-          <p:cNvPr id="30" name="TextBox 29">
-            <a:extLst>
-              <a:ext uri="{FF2B5EF4-FFF2-40B4-BE49-F238E27FC236}">
-                <a16:creationId xmlns:a16="http://schemas.microsoft.com/office/drawing/2014/main" id="{B8B3D109-BC89-9E46-99AE-494C23346268}"/>
-              </a:ext>
-            </a:extLst>
-          </p:cNvPr>
-          <p:cNvSpPr txBox="1"/>
-          <p:nvPr/>
-        </p:nvSpPr>
-        <p:spPr>
-          <a:xfrm>
-            <a:off x="3782404" y="1701839"/>
-            <a:ext cx="1093569" cy="369332"/>
-          </a:xfrm>
-          <a:prstGeom prst="rect">
-            <a:avLst/>
-          </a:prstGeom>
-          <a:noFill/>
-        </p:spPr>
-        <p:txBody>
-          <a:bodyPr wrap="none" rtlCol="0">
-            <a:spAutoFit/>
-          </a:bodyPr>
-          <a:lstStyle/>
-          <a:p>
-            <a:r>
-              <a:rPr lang="en-US" dirty="0"/>
-              <a:t>Customer</a:t>
-            </a:r>
-          </a:p>
-        </p:txBody>
-      </p:sp>
-      <p:sp>
-        <p:nvSpPr>
-          <p:cNvPr id="31" name="Frame 30">
-            <a:extLst>
-              <a:ext uri="{FF2B5EF4-FFF2-40B4-BE49-F238E27FC236}">
-                <a16:creationId xmlns:a16="http://schemas.microsoft.com/office/drawing/2014/main" id="{700560D0-5E88-B84E-BF42-517825B11CC6}"/>
-              </a:ext>
-            </a:extLst>
-          </p:cNvPr>
-          <p:cNvSpPr/>
-          <p:nvPr/>
-        </p:nvSpPr>
-        <p:spPr>
-          <a:xfrm>
-            <a:off x="6326332" y="2121763"/>
-            <a:ext cx="5122415" cy="3817398"/>
-          </a:xfrm>
-          <a:prstGeom prst="frame">
-            <a:avLst/>
-          </a:prstGeom>
-        </p:spPr>
-        <p:style>
-          <a:lnRef idx="2">
-            <a:schemeClr val="accent1">
-              <a:shade val="50000"/>
-            </a:schemeClr>
-          </a:lnRef>
-          <a:fillRef idx="1">
-            <a:schemeClr val="accent1"/>
-          </a:fillRef>
-          <a:effectRef idx="0">
-            <a:schemeClr val="accent1"/>
-          </a:effectRef>
-          <a:fontRef idx="minor">
-            <a:schemeClr val="lt1"/>
-          </a:fontRef>
-        </p:style>
-        <p:txBody>
-          <a:bodyPr rtlCol="0" anchor="ctr"/>
-          <a:lstStyle/>
-          <a:p>
-            <a:pPr algn="ctr"/>
-            <a:endParaRPr lang="en-US" dirty="0">
+              <a:rPr lang="en-IN" b="1" dirty="0">
+                <a:solidFill>
+                  <a:srgbClr val="254869"/>
+                </a:solidFill>
+                <a:latin typeface="Montserrat" pitchFamily="2" charset="77"/>
+              </a:rPr>
+              <a:t>NAT Instance</a:t>
+            </a:r>
+          </a:p>
+          <a:p>
+            <a:r>
+              <a:rPr lang="en-IN" dirty="0">
+                <a:solidFill>
+                  <a:srgbClr val="2C3346"/>
+                </a:solidFill>
+                <a:latin typeface="Open Sans" panose="020B0606030504020204" pitchFamily="34" charset="0"/>
+              </a:rPr>
+              <a:t>Unlike NAT Gateway and Internet Gateway, a NAT Instance is not a special service offered by AWS</a:t>
+            </a:r>
+          </a:p>
+          <a:p>
+            <a:r>
+              <a:rPr lang="en-IN" dirty="0">
+                <a:solidFill>
+                  <a:srgbClr val="2C3346"/>
+                </a:solidFill>
+                <a:latin typeface="Open Sans" panose="020B0606030504020204" pitchFamily="34" charset="0"/>
+              </a:rPr>
+              <a:t>It is just a term for when using an EC2 instance to perform NAT Gateway-like functionality</a:t>
+            </a:r>
+          </a:p>
+          <a:p>
+            <a:endParaRPr lang="en-IN" dirty="0">
               <a:solidFill>
-                <a:schemeClr val="tx1"/>
+                <a:srgbClr val="2C3346"/>
               </a:solidFill>
+              <a:latin typeface="Open Sans" panose="020B0606030504020204" pitchFamily="34" charset="0"/>
             </a:endParaRPr>
           </a:p>
-        </p:txBody>
-      </p:sp>
-      <p:cxnSp>
-        <p:nvCxnSpPr>
-          <p:cNvPr id="32" name="Straight Connector 31">
-            <a:extLst>
-              <a:ext uri="{FF2B5EF4-FFF2-40B4-BE49-F238E27FC236}">
-                <a16:creationId xmlns:a16="http://schemas.microsoft.com/office/drawing/2014/main" id="{C567F3A6-C01F-0A4D-A206-67C00DDD5E5F}"/>
-              </a:ext>
-            </a:extLst>
-          </p:cNvPr>
-          <p:cNvCxnSpPr/>
-          <p:nvPr/>
-        </p:nvCxnSpPr>
-        <p:spPr>
-          <a:xfrm>
-            <a:off x="6869161" y="3879542"/>
-            <a:ext cx="4136994" cy="0"/>
-          </a:xfrm>
-          <a:prstGeom prst="line">
-            <a:avLst/>
-          </a:prstGeom>
-        </p:spPr>
-        <p:style>
-          <a:lnRef idx="1">
-            <a:schemeClr val="accent1"/>
-          </a:lnRef>
-          <a:fillRef idx="0">
-            <a:schemeClr val="accent1"/>
-          </a:fillRef>
-          <a:effectRef idx="0">
-            <a:schemeClr val="accent1"/>
-          </a:effectRef>
-          <a:fontRef idx="minor">
-            <a:schemeClr val="tx1"/>
-          </a:fontRef>
-        </p:style>
-      </p:cxnSp>
-      <p:sp>
-        <p:nvSpPr>
-          <p:cNvPr id="33" name="TextBox 32">
-            <a:extLst>
-              <a:ext uri="{FF2B5EF4-FFF2-40B4-BE49-F238E27FC236}">
-                <a16:creationId xmlns:a16="http://schemas.microsoft.com/office/drawing/2014/main" id="{C1723E35-7190-B648-B506-5DAD5BA5AB40}"/>
-              </a:ext>
-            </a:extLst>
-          </p:cNvPr>
-          <p:cNvSpPr txBox="1"/>
-          <p:nvPr/>
-        </p:nvSpPr>
-        <p:spPr>
-          <a:xfrm>
-            <a:off x="6869161" y="2649076"/>
-            <a:ext cx="1465851" cy="369332"/>
-          </a:xfrm>
-          <a:prstGeom prst="rect">
-            <a:avLst/>
-          </a:prstGeom>
-          <a:noFill/>
-        </p:spPr>
-        <p:txBody>
-          <a:bodyPr wrap="none" rtlCol="0">
-            <a:spAutoFit/>
-          </a:bodyPr>
-          <a:lstStyle/>
-          <a:p>
-            <a:r>
-              <a:rPr lang="en-US" dirty="0"/>
-              <a:t>Public Subnet</a:t>
-            </a:r>
-          </a:p>
-        </p:txBody>
-      </p:sp>
-      <p:sp>
-        <p:nvSpPr>
-          <p:cNvPr id="34" name="TextBox 33">
-            <a:extLst>
-              <a:ext uri="{FF2B5EF4-FFF2-40B4-BE49-F238E27FC236}">
-                <a16:creationId xmlns:a16="http://schemas.microsoft.com/office/drawing/2014/main" id="{33801579-2B59-C14D-9ADC-F8F85B850B6E}"/>
-              </a:ext>
-            </a:extLst>
-          </p:cNvPr>
-          <p:cNvSpPr txBox="1"/>
-          <p:nvPr/>
-        </p:nvSpPr>
-        <p:spPr>
-          <a:xfrm>
-            <a:off x="6944622" y="4065973"/>
-            <a:ext cx="1603709" cy="369332"/>
-          </a:xfrm>
-          <a:prstGeom prst="rect">
-            <a:avLst/>
-          </a:prstGeom>
-          <a:noFill/>
-        </p:spPr>
-        <p:txBody>
-          <a:bodyPr wrap="none" rtlCol="0">
-            <a:spAutoFit/>
-          </a:bodyPr>
-          <a:lstStyle/>
-          <a:p>
-            <a:r>
-              <a:rPr lang="en-US" dirty="0"/>
-              <a:t>Private  Subnet</a:t>
-            </a:r>
-          </a:p>
-        </p:txBody>
-      </p:sp>
-      <p:cxnSp>
-        <p:nvCxnSpPr>
-          <p:cNvPr id="35" name="Straight Arrow Connector 34">
-            <a:extLst>
-              <a:ext uri="{FF2B5EF4-FFF2-40B4-BE49-F238E27FC236}">
-                <a16:creationId xmlns:a16="http://schemas.microsoft.com/office/drawing/2014/main" id="{E95AB327-8181-5143-AE8B-C94F6B263598}"/>
-              </a:ext>
-            </a:extLst>
-          </p:cNvPr>
-          <p:cNvCxnSpPr>
-            <a:cxnSpLocks/>
-          </p:cNvCxnSpPr>
-          <p:nvPr/>
-        </p:nvCxnSpPr>
-        <p:spPr>
-          <a:xfrm>
-            <a:off x="9273435" y="1728472"/>
-            <a:ext cx="0" cy="1316569"/>
-          </a:xfrm>
-          <a:prstGeom prst="straightConnector1">
-            <a:avLst/>
-          </a:prstGeom>
-          <a:ln>
-            <a:tailEnd type="triangle"/>
-          </a:ln>
-        </p:spPr>
-        <p:style>
-          <a:lnRef idx="1">
-            <a:schemeClr val="accent1"/>
-          </a:lnRef>
-          <a:fillRef idx="0">
-            <a:schemeClr val="accent1"/>
-          </a:fillRef>
-          <a:effectRef idx="0">
-            <a:schemeClr val="accent1"/>
-          </a:effectRef>
-          <a:fontRef idx="minor">
-            <a:schemeClr val="tx1"/>
-          </a:fontRef>
-        </p:style>
-      </p:cxnSp>
-      <p:sp>
-        <p:nvSpPr>
-          <p:cNvPr id="36" name="Oval 35">
-            <a:extLst>
-              <a:ext uri="{FF2B5EF4-FFF2-40B4-BE49-F238E27FC236}">
-                <a16:creationId xmlns:a16="http://schemas.microsoft.com/office/drawing/2014/main" id="{706E0095-FF0D-914C-A94E-FB6ACA6E5462}"/>
-              </a:ext>
-            </a:extLst>
-          </p:cNvPr>
-          <p:cNvSpPr/>
-          <p:nvPr/>
-        </p:nvSpPr>
-        <p:spPr>
-          <a:xfrm>
-            <a:off x="8827722" y="3018408"/>
-            <a:ext cx="1188574" cy="683581"/>
-          </a:xfrm>
-          <a:prstGeom prst="ellipse">
-            <a:avLst/>
-          </a:prstGeom>
-        </p:spPr>
-        <p:style>
-          <a:lnRef idx="2">
-            <a:schemeClr val="accent6"/>
-          </a:lnRef>
-          <a:fillRef idx="1">
-            <a:schemeClr val="lt1"/>
-          </a:fillRef>
-          <a:effectRef idx="0">
-            <a:schemeClr val="accent6"/>
-          </a:effectRef>
-          <a:fontRef idx="minor">
-            <a:schemeClr val="dk1"/>
-          </a:fontRef>
-        </p:style>
-        <p:txBody>
-          <a:bodyPr rtlCol="0" anchor="ctr"/>
-          <a:lstStyle/>
-          <a:p>
-            <a:pPr algn="ctr"/>
-            <a:r>
-              <a:rPr lang="en-US" dirty="0"/>
-              <a:t>Web Server</a:t>
-            </a:r>
-          </a:p>
-        </p:txBody>
-      </p:sp>
-      <p:sp>
-        <p:nvSpPr>
-          <p:cNvPr id="37" name="Oval 36">
-            <a:extLst>
-              <a:ext uri="{FF2B5EF4-FFF2-40B4-BE49-F238E27FC236}">
-                <a16:creationId xmlns:a16="http://schemas.microsoft.com/office/drawing/2014/main" id="{0F1DF2C6-D499-2947-A0C1-1BEC58BDB1FC}"/>
-              </a:ext>
-            </a:extLst>
-          </p:cNvPr>
-          <p:cNvSpPr/>
-          <p:nvPr/>
-        </p:nvSpPr>
-        <p:spPr>
-          <a:xfrm>
-            <a:off x="8702401" y="4057095"/>
-            <a:ext cx="1807895" cy="692458"/>
-          </a:xfrm>
-          <a:prstGeom prst="ellipse">
-            <a:avLst/>
-          </a:prstGeom>
-        </p:spPr>
-        <p:style>
-          <a:lnRef idx="2">
-            <a:schemeClr val="accent6"/>
-          </a:lnRef>
-          <a:fillRef idx="1">
-            <a:schemeClr val="lt1"/>
-          </a:fillRef>
-          <a:effectRef idx="0">
-            <a:schemeClr val="accent6"/>
-          </a:effectRef>
-          <a:fontRef idx="minor">
-            <a:schemeClr val="dk1"/>
-          </a:fontRef>
-        </p:style>
-        <p:txBody>
-          <a:bodyPr rtlCol="0" anchor="ctr"/>
-          <a:lstStyle/>
-          <a:p>
-            <a:pPr algn="ctr"/>
-            <a:r>
-              <a:rPr lang="en-US" dirty="0"/>
-              <a:t>Application</a:t>
-            </a:r>
-          </a:p>
-        </p:txBody>
-      </p:sp>
-      <p:sp>
-        <p:nvSpPr>
-          <p:cNvPr id="38" name="Can 37">
-            <a:extLst>
-              <a:ext uri="{FF2B5EF4-FFF2-40B4-BE49-F238E27FC236}">
-                <a16:creationId xmlns:a16="http://schemas.microsoft.com/office/drawing/2014/main" id="{CA42F886-BA42-2346-A732-781D279E743A}"/>
-              </a:ext>
-            </a:extLst>
-          </p:cNvPr>
-          <p:cNvSpPr/>
-          <p:nvPr/>
-        </p:nvSpPr>
-        <p:spPr>
-          <a:xfrm>
-            <a:off x="9422009" y="5078028"/>
-            <a:ext cx="452761" cy="346229"/>
-          </a:xfrm>
-          <a:prstGeom prst="can">
-            <a:avLst/>
-          </a:prstGeom>
-        </p:spPr>
-        <p:style>
-          <a:lnRef idx="2">
-            <a:schemeClr val="accent1">
-              <a:shade val="50000"/>
-            </a:schemeClr>
-          </a:lnRef>
-          <a:fillRef idx="1">
-            <a:schemeClr val="accent1"/>
-          </a:fillRef>
-          <a:effectRef idx="0">
-            <a:schemeClr val="accent1"/>
-          </a:effectRef>
-          <a:fontRef idx="minor">
-            <a:schemeClr val="lt1"/>
-          </a:fontRef>
-        </p:style>
-        <p:txBody>
-          <a:bodyPr rtlCol="0" anchor="ctr"/>
-          <a:lstStyle/>
-          <a:p>
-            <a:pPr algn="ctr"/>
-            <a:r>
-              <a:rPr lang="en-US" dirty="0"/>
-              <a:t>DB</a:t>
-            </a:r>
-          </a:p>
-        </p:txBody>
-      </p:sp>
-      <p:sp>
-        <p:nvSpPr>
-          <p:cNvPr id="39" name="TextBox 38">
-            <a:extLst>
-              <a:ext uri="{FF2B5EF4-FFF2-40B4-BE49-F238E27FC236}">
-                <a16:creationId xmlns:a16="http://schemas.microsoft.com/office/drawing/2014/main" id="{683DD4FA-B8C7-B041-A75F-FB4E477F50C2}"/>
-              </a:ext>
-            </a:extLst>
-          </p:cNvPr>
-          <p:cNvSpPr txBox="1"/>
-          <p:nvPr/>
-        </p:nvSpPr>
-        <p:spPr>
-          <a:xfrm>
-            <a:off x="10016296" y="3598987"/>
-            <a:ext cx="436338" cy="369332"/>
-          </a:xfrm>
-          <a:prstGeom prst="rect">
-            <a:avLst/>
-          </a:prstGeom>
-          <a:noFill/>
-        </p:spPr>
-        <p:txBody>
-          <a:bodyPr wrap="none" rtlCol="0">
-            <a:spAutoFit/>
-          </a:bodyPr>
-          <a:lstStyle/>
-          <a:p>
-            <a:r>
-              <a:rPr lang="en-US" dirty="0"/>
-              <a:t>SG</a:t>
-            </a:r>
-          </a:p>
-        </p:txBody>
-      </p:sp>
-      <p:sp>
-        <p:nvSpPr>
-          <p:cNvPr id="40" name="Rectangle 39">
-            <a:extLst>
-              <a:ext uri="{FF2B5EF4-FFF2-40B4-BE49-F238E27FC236}">
-                <a16:creationId xmlns:a16="http://schemas.microsoft.com/office/drawing/2014/main" id="{695F43F9-73B8-1A4F-B868-4D726F76339D}"/>
-              </a:ext>
-            </a:extLst>
-          </p:cNvPr>
-          <p:cNvSpPr/>
-          <p:nvPr/>
-        </p:nvSpPr>
-        <p:spPr>
-          <a:xfrm>
-            <a:off x="10116000" y="4740677"/>
-            <a:ext cx="436338" cy="369332"/>
-          </a:xfrm>
-          <a:prstGeom prst="rect">
-            <a:avLst/>
-          </a:prstGeom>
-        </p:spPr>
-        <p:txBody>
-          <a:bodyPr wrap="none">
-            <a:spAutoFit/>
-          </a:bodyPr>
-          <a:lstStyle/>
-          <a:p>
-            <a:r>
-              <a:rPr lang="en-US" dirty="0"/>
-              <a:t>SG</a:t>
-            </a:r>
-          </a:p>
-        </p:txBody>
-      </p:sp>
-      <p:sp>
-        <p:nvSpPr>
-          <p:cNvPr id="41" name="TextBox 40">
-            <a:extLst>
-              <a:ext uri="{FF2B5EF4-FFF2-40B4-BE49-F238E27FC236}">
-                <a16:creationId xmlns:a16="http://schemas.microsoft.com/office/drawing/2014/main" id="{3C743783-9A3D-DA46-9D13-794D9C4738BE}"/>
-              </a:ext>
-            </a:extLst>
-          </p:cNvPr>
-          <p:cNvSpPr txBox="1"/>
-          <p:nvPr/>
-        </p:nvSpPr>
-        <p:spPr>
-          <a:xfrm>
-            <a:off x="9422009" y="1728472"/>
-            <a:ext cx="1093569" cy="369332"/>
-          </a:xfrm>
-          <a:prstGeom prst="rect">
-            <a:avLst/>
-          </a:prstGeom>
-          <a:noFill/>
-        </p:spPr>
-        <p:txBody>
-          <a:bodyPr wrap="none" rtlCol="0">
-            <a:spAutoFit/>
-          </a:bodyPr>
-          <a:lstStyle/>
-          <a:p>
-            <a:r>
-              <a:rPr lang="en-US" dirty="0"/>
-              <a:t>Customer</a:t>
-            </a:r>
-          </a:p>
-        </p:txBody>
-      </p:sp>
-      <p:sp>
-        <p:nvSpPr>
-          <p:cNvPr id="43" name="TextBox 42">
-            <a:extLst>
-              <a:ext uri="{FF2B5EF4-FFF2-40B4-BE49-F238E27FC236}">
-                <a16:creationId xmlns:a16="http://schemas.microsoft.com/office/drawing/2014/main" id="{8C810252-0966-6541-BA84-2BFEEF82E56E}"/>
-              </a:ext>
-            </a:extLst>
-          </p:cNvPr>
-          <p:cNvSpPr txBox="1"/>
-          <p:nvPr/>
-        </p:nvSpPr>
-        <p:spPr>
-          <a:xfrm>
-            <a:off x="2539014" y="6214369"/>
-            <a:ext cx="1226618" cy="369332"/>
-          </a:xfrm>
-          <a:prstGeom prst="rect">
-            <a:avLst/>
-          </a:prstGeom>
-          <a:noFill/>
-        </p:spPr>
-        <p:txBody>
-          <a:bodyPr wrap="none" rtlCol="0">
-            <a:spAutoFit/>
-          </a:bodyPr>
-          <a:lstStyle/>
-          <a:p>
-            <a:r>
-              <a:rPr lang="en-US" dirty="0"/>
-              <a:t>AZ1 - KPHB</a:t>
-            </a:r>
-          </a:p>
-        </p:txBody>
-      </p:sp>
-      <p:sp>
-        <p:nvSpPr>
-          <p:cNvPr id="44" name="TextBox 43">
-            <a:extLst>
-              <a:ext uri="{FF2B5EF4-FFF2-40B4-BE49-F238E27FC236}">
-                <a16:creationId xmlns:a16="http://schemas.microsoft.com/office/drawing/2014/main" id="{7D0B04C7-FF90-C342-8F29-49DBF033C51E}"/>
-              </a:ext>
-            </a:extLst>
-          </p:cNvPr>
-          <p:cNvSpPr txBox="1"/>
-          <p:nvPr/>
-        </p:nvSpPr>
-        <p:spPr>
-          <a:xfrm>
-            <a:off x="8134904" y="6214369"/>
-            <a:ext cx="1317027" cy="369332"/>
-          </a:xfrm>
-          <a:prstGeom prst="rect">
-            <a:avLst/>
-          </a:prstGeom>
-          <a:noFill/>
-        </p:spPr>
-        <p:txBody>
-          <a:bodyPr wrap="none" rtlCol="0">
-            <a:spAutoFit/>
-          </a:bodyPr>
-          <a:lstStyle/>
-          <a:p>
-            <a:r>
-              <a:rPr lang="en-US" dirty="0"/>
-              <a:t>AZ2 - UPPAL</a:t>
-            </a:r>
-          </a:p>
-        </p:txBody>
-      </p:sp>
-      <p:sp>
-        <p:nvSpPr>
-          <p:cNvPr id="46" name="Frame 45">
-            <a:extLst>
-              <a:ext uri="{FF2B5EF4-FFF2-40B4-BE49-F238E27FC236}">
-                <a16:creationId xmlns:a16="http://schemas.microsoft.com/office/drawing/2014/main" id="{2166FAA8-5D1A-7B4D-9831-7EF7F4C3C1A5}"/>
-              </a:ext>
-            </a:extLst>
-          </p:cNvPr>
-          <p:cNvSpPr/>
-          <p:nvPr/>
-        </p:nvSpPr>
-        <p:spPr>
-          <a:xfrm>
-            <a:off x="372862" y="1580225"/>
-            <a:ext cx="11567604" cy="5655076"/>
-          </a:xfrm>
-          <a:prstGeom prst="frame">
-            <a:avLst/>
-          </a:prstGeom>
-        </p:spPr>
-        <p:style>
-          <a:lnRef idx="2">
-            <a:schemeClr val="accent6"/>
-          </a:lnRef>
-          <a:fillRef idx="1">
-            <a:schemeClr val="lt1"/>
-          </a:fillRef>
-          <a:effectRef idx="0">
-            <a:schemeClr val="accent6"/>
-          </a:effectRef>
-          <a:fontRef idx="minor">
-            <a:schemeClr val="dk1"/>
-          </a:fontRef>
-        </p:style>
-        <p:txBody>
-          <a:bodyPr rtlCol="0" anchor="ctr"/>
-          <a:lstStyle/>
-          <a:p>
-            <a:pPr algn="ctr"/>
-            <a:endParaRPr lang="en-US" dirty="0">
+          <a:p>
+            <a:r>
+              <a:rPr lang="en-IN" dirty="0">
+                <a:solidFill>
+                  <a:srgbClr val="2C3346"/>
+                </a:solidFill>
+                <a:latin typeface="Open Sans" panose="020B0606030504020204" pitchFamily="34" charset="0"/>
+              </a:rPr>
+              <a:t>Because it is a self-managed instance, configuring routing, updating the software and operating system, and right-sizing instances is the responsibility of the owner</a:t>
+            </a:r>
+          </a:p>
+          <a:p>
+            <a:endParaRPr lang="en-IN" dirty="0">
               <a:solidFill>
-                <a:schemeClr val="tx1"/>
+                <a:srgbClr val="2C3346"/>
               </a:solidFill>
+              <a:latin typeface="Open Sans" panose="020B0606030504020204" pitchFamily="34" charset="0"/>
             </a:endParaRPr>
           </a:p>
-        </p:txBody>
-      </p:sp>
-      <p:sp>
-        <p:nvSpPr>
-          <p:cNvPr id="47" name="TextBox 46">
-            <a:extLst>
-              <a:ext uri="{FF2B5EF4-FFF2-40B4-BE49-F238E27FC236}">
-                <a16:creationId xmlns:a16="http://schemas.microsoft.com/office/drawing/2014/main" id="{1F20B82B-A994-C145-93C9-57687F856063}"/>
-              </a:ext>
-            </a:extLst>
-          </p:cNvPr>
-          <p:cNvSpPr txBox="1"/>
-          <p:nvPr/>
-        </p:nvSpPr>
-        <p:spPr>
-          <a:xfrm>
-            <a:off x="5366550" y="1251750"/>
-            <a:ext cx="1902829" cy="369332"/>
-          </a:xfrm>
-          <a:prstGeom prst="rect">
-            <a:avLst/>
-          </a:prstGeom>
-          <a:noFill/>
-        </p:spPr>
-        <p:txBody>
-          <a:bodyPr wrap="none" rtlCol="0">
-            <a:spAutoFit/>
-          </a:bodyPr>
-          <a:lstStyle/>
-          <a:p>
-            <a:r>
-              <a:rPr lang="en-US" dirty="0"/>
-              <a:t>Hyderabad Region</a:t>
-            </a:r>
-          </a:p>
-        </p:txBody>
-      </p:sp>
-      <p:sp>
-        <p:nvSpPr>
-          <p:cNvPr id="48" name="Rectangle 47">
-            <a:extLst>
-              <a:ext uri="{FF2B5EF4-FFF2-40B4-BE49-F238E27FC236}">
-                <a16:creationId xmlns:a16="http://schemas.microsoft.com/office/drawing/2014/main" id="{FBE8B6E7-ED1E-124E-AF97-C72DFF6407A6}"/>
-              </a:ext>
-            </a:extLst>
-          </p:cNvPr>
-          <p:cNvSpPr/>
-          <p:nvPr/>
-        </p:nvSpPr>
-        <p:spPr>
-          <a:xfrm>
-            <a:off x="4329188" y="6828078"/>
-            <a:ext cx="1851212" cy="584775"/>
-          </a:xfrm>
-          <a:prstGeom prst="rect">
-            <a:avLst/>
-          </a:prstGeom>
-        </p:spPr>
-        <p:txBody>
-          <a:bodyPr wrap="none">
-            <a:spAutoFit/>
-          </a:bodyPr>
-          <a:lstStyle/>
-          <a:p>
-            <a:r>
-              <a:rPr lang="en-US" sz="1400" b="1" dirty="0"/>
-              <a:t>Running Notes in class</a:t>
-            </a:r>
-          </a:p>
-          <a:p>
-            <a:endParaRPr lang="en-US" dirty="0"/>
+          <a:p>
+            <a:r>
+              <a:rPr lang="en-IN" dirty="0">
+                <a:solidFill>
+                  <a:srgbClr val="2C3346"/>
+                </a:solidFill>
+                <a:latin typeface="Open Sans" panose="020B0606030504020204" pitchFamily="34" charset="0"/>
+              </a:rPr>
+              <a:t>Similar to a NAT Gateway, a NAT Instance will need to be in a public subnet, and a private subnet will need a route to the NAT Instance to have internet access</a:t>
+            </a:r>
+          </a:p>
+          <a:p>
+            <a:endParaRPr lang="en-IN" dirty="0">
+              <a:solidFill>
+                <a:srgbClr val="2C3346"/>
+              </a:solidFill>
+              <a:latin typeface="Open Sans" panose="020B0606030504020204" pitchFamily="34" charset="0"/>
+            </a:endParaRPr>
+          </a:p>
+          <a:p>
+            <a:r>
+              <a:rPr lang="en-IN" b="1" dirty="0">
+                <a:solidFill>
+                  <a:srgbClr val="2C3346"/>
+                </a:solidFill>
+                <a:latin typeface="Open Sans" panose="020B0606030504020204" pitchFamily="34" charset="0"/>
+              </a:rPr>
+              <a:t> </a:t>
+            </a:r>
+            <a:r>
+              <a:rPr lang="en-IN" sz="1400" b="1" dirty="0">
+                <a:solidFill>
+                  <a:srgbClr val="2C3346"/>
+                </a:solidFill>
+                <a:latin typeface="Open Sans" panose="020B0606030504020204" pitchFamily="34" charset="0"/>
+              </a:rPr>
+              <a:t>It is generally not recommended unless there is a specific use-case that needs to support this customization</a:t>
+            </a:r>
           </a:p>
         </p:txBody>
       </p:sp>
     </p:spTree>
     <p:extLst>
       <p:ext uri="{BB962C8B-B14F-4D97-AF65-F5344CB8AC3E}">
-        <p14:creationId xmlns:p14="http://schemas.microsoft.com/office/powerpoint/2010/main" val="3049661956"/>
+        <p14:creationId xmlns:p14="http://schemas.microsoft.com/office/powerpoint/2010/main" val="4146779108"/>
       </p:ext>
     </p:extLst>
   </p:cSld>

</xml_diff>